<commit_message>
feb 24 slides and lab 2 deflections
</commit_message>
<xml_diff>
--- a/slides/feb24.pptx
+++ b/slides/feb24.pptx
@@ -5,41 +5,42 @@
     <p:sldMasterId id="2147483702" r:id="rId1"/>
   </p:sldMasterIdLst>
   <p:notesMasterIdLst>
-    <p:notesMasterId r:id="rId34"/>
+    <p:notesMasterId r:id="rId35"/>
   </p:notesMasterIdLst>
   <p:sldIdLst>
     <p:sldId id="256" r:id="rId2"/>
-    <p:sldId id="257" r:id="rId3"/>
-    <p:sldId id="288" r:id="rId4"/>
-    <p:sldId id="261" r:id="rId5"/>
-    <p:sldId id="262" r:id="rId6"/>
-    <p:sldId id="263" r:id="rId7"/>
-    <p:sldId id="264" r:id="rId8"/>
-    <p:sldId id="265" r:id="rId9"/>
-    <p:sldId id="267" r:id="rId10"/>
-    <p:sldId id="266" r:id="rId11"/>
-    <p:sldId id="268" r:id="rId12"/>
-    <p:sldId id="284" r:id="rId13"/>
-    <p:sldId id="270" r:id="rId14"/>
-    <p:sldId id="285" r:id="rId15"/>
-    <p:sldId id="258" r:id="rId16"/>
-    <p:sldId id="291" r:id="rId17"/>
-    <p:sldId id="292" r:id="rId18"/>
-    <p:sldId id="293" r:id="rId19"/>
-    <p:sldId id="294" r:id="rId20"/>
-    <p:sldId id="259" r:id="rId21"/>
-    <p:sldId id="260" r:id="rId22"/>
-    <p:sldId id="278" r:id="rId23"/>
-    <p:sldId id="279" r:id="rId24"/>
-    <p:sldId id="282" r:id="rId25"/>
-    <p:sldId id="286" r:id="rId26"/>
-    <p:sldId id="290" r:id="rId27"/>
-    <p:sldId id="295" r:id="rId28"/>
-    <p:sldId id="296" r:id="rId29"/>
-    <p:sldId id="297" r:id="rId30"/>
-    <p:sldId id="298" r:id="rId31"/>
-    <p:sldId id="300" r:id="rId32"/>
-    <p:sldId id="287" r:id="rId33"/>
+    <p:sldId id="301" r:id="rId3"/>
+    <p:sldId id="257" r:id="rId4"/>
+    <p:sldId id="288" r:id="rId5"/>
+    <p:sldId id="261" r:id="rId6"/>
+    <p:sldId id="262" r:id="rId7"/>
+    <p:sldId id="263" r:id="rId8"/>
+    <p:sldId id="264" r:id="rId9"/>
+    <p:sldId id="265" r:id="rId10"/>
+    <p:sldId id="267" r:id="rId11"/>
+    <p:sldId id="266" r:id="rId12"/>
+    <p:sldId id="268" r:id="rId13"/>
+    <p:sldId id="284" r:id="rId14"/>
+    <p:sldId id="270" r:id="rId15"/>
+    <p:sldId id="285" r:id="rId16"/>
+    <p:sldId id="258" r:id="rId17"/>
+    <p:sldId id="291" r:id="rId18"/>
+    <p:sldId id="292" r:id="rId19"/>
+    <p:sldId id="293" r:id="rId20"/>
+    <p:sldId id="294" r:id="rId21"/>
+    <p:sldId id="259" r:id="rId22"/>
+    <p:sldId id="260" r:id="rId23"/>
+    <p:sldId id="278" r:id="rId24"/>
+    <p:sldId id="279" r:id="rId25"/>
+    <p:sldId id="282" r:id="rId26"/>
+    <p:sldId id="286" r:id="rId27"/>
+    <p:sldId id="290" r:id="rId28"/>
+    <p:sldId id="295" r:id="rId29"/>
+    <p:sldId id="296" r:id="rId30"/>
+    <p:sldId id="297" r:id="rId31"/>
+    <p:sldId id="298" r:id="rId32"/>
+    <p:sldId id="300" r:id="rId33"/>
+    <p:sldId id="287" r:id="rId34"/>
   </p:sldIdLst>
   <p:sldSz cx="12192000" cy="6858000"/>
   <p:notesSz cx="6858000" cy="9144000"/>
@@ -10021,7 +10022,7 @@
       <dgm:spPr/>
     </dgm:pt>
     <dgm:pt modelId="{24CA504A-CF4C-1047-89A9-611BE8533D23}" type="pres">
-      <dgm:prSet presAssocID="{D7228F62-28EF-481A-B5BC-71A178617102}" presName="node" presStyleLbl="node1" presStyleIdx="4" presStyleCnt="6" custScaleX="190731">
+      <dgm:prSet presAssocID="{D7228F62-28EF-481A-B5BC-71A178617102}" presName="node" presStyleLbl="node1" presStyleIdx="4" presStyleCnt="6" custScaleX="190731" custRadScaleRad="101020" custRadScaleInc="31137">
         <dgm:presLayoutVars>
           <dgm:bulletEnabled val="1"/>
         </dgm:presLayoutVars>
@@ -13712,7 +13713,7 @@
       </dsp:nvSpPr>
       <dsp:spPr>
         <a:xfrm>
-          <a:off x="4033768" y="431771"/>
+          <a:off x="3974085" y="390583"/>
           <a:ext cx="4062785" cy="4062785"/>
         </a:xfrm>
         <a:custGeom>
@@ -13724,9 +13725,9 @@
           <a:pathLst>
             <a:path>
               <a:moveTo>
-                <a:pt x="845335" y="3680581"/>
+                <a:pt x="902699" y="3720359"/>
               </a:moveTo>
-              <a:arcTo wR="2031392" hR="2031392" stAng="7543368" swAng="526739"/>
+              <a:arcTo wR="2031392" hR="2031392" stAng="7425228" swAng="978972"/>
             </a:path>
           </a:pathLst>
         </a:custGeom>
@@ -13764,7 +13765,7 @@
       </dsp:nvSpPr>
       <dsp:spPr>
         <a:xfrm>
-          <a:off x="3041448" y="3047935"/>
+          <a:off x="2922689" y="2859461"/>
           <a:ext cx="2528949" cy="861850"/>
         </a:xfrm>
         <a:prstGeom prst="roundRect">
@@ -13830,7 +13831,7 @@
         </a:p>
       </dsp:txBody>
       <dsp:txXfrm>
-        <a:off x="3083520" y="3090007"/>
+        <a:off x="2964761" y="2901533"/>
         <a:ext cx="2444805" cy="777706"/>
       </dsp:txXfrm>
     </dsp:sp>
@@ -13841,7 +13842,7 @@
       </dsp:nvSpPr>
       <dsp:spPr>
         <a:xfrm>
-          <a:off x="4033768" y="431771"/>
+          <a:off x="4020578" y="473978"/>
           <a:ext cx="4062785" cy="4062785"/>
         </a:xfrm>
         <a:custGeom>
@@ -13853,9 +13854,9 @@
           <a:pathLst>
             <a:path>
               <a:moveTo>
-                <a:pt x="82653" y="2604953"/>
+                <a:pt x="29407" y="2375795"/>
               </a:moveTo>
-              <a:arcTo wR="2031392" hR="2031392" stAng="9815974" swAng="1968051"/>
+              <a:arcTo wR="2031392" hR="2031392" stAng="10214335" swAng="1647675"/>
             </a:path>
           </a:pathLst>
         </a:custGeom>
@@ -33055,7 +33056,7 @@
           <a:p>
             <a:fld id="{FCEDD4FD-F111-F84A-AD1A-E88CDF3A725C}" type="slidenum">
               <a:rPr lang="en-US" smtClean="0"/>
-              <a:t>3</a:t>
+              <a:t>4</a:t>
             </a:fld>
             <a:endParaRPr lang="en-US"/>
           </a:p>
@@ -36895,6 +36896,551 @@
 <file path=ppt/slides/slide10.xml><?xml version="1.0" encoding="utf-8"?>
 <p:sld xmlns:a="http://schemas.openxmlformats.org/drawingml/2006/main" xmlns:r="http://schemas.openxmlformats.org/officeDocument/2006/relationships" xmlns:p="http://schemas.openxmlformats.org/presentationml/2006/main">
   <p:cSld>
+    <p:bg>
+      <p:bgPr>
+        <a:solidFill>
+          <a:schemeClr val="bg1"/>
+        </a:solidFill>
+        <a:effectLst/>
+      </p:bgPr>
+    </p:bg>
+    <p:spTree>
+      <p:nvGrpSpPr>
+        <p:cNvPr id="1" name=""/>
+        <p:cNvGrpSpPr/>
+        <p:nvPr/>
+      </p:nvGrpSpPr>
+      <p:grpSpPr>
+        <a:xfrm>
+          <a:off x="0" y="0"/>
+          <a:ext cx="0" cy="0"/>
+          <a:chOff x="0" y="0"/>
+          <a:chExt cx="0" cy="0"/>
+        </a:xfrm>
+      </p:grpSpPr>
+      <p:sp>
+        <p:nvSpPr>
+          <p:cNvPr id="8" name="Rectangle 7">
+            <a:extLst>
+              <a:ext uri="{FF2B5EF4-FFF2-40B4-BE49-F238E27FC236}">
+                <a16:creationId xmlns:a16="http://schemas.microsoft.com/office/drawing/2014/main" id="{1A59258C-AAC2-41CD-973C-7439B122A3FF}"/>
+              </a:ext>
+              <a:ext uri="{C183D7F6-B498-43B3-948B-1728B52AA6E4}">
+                <adec:decorative xmlns:adec="http://schemas.microsoft.com/office/drawing/2017/decorative" val="1"/>
+              </a:ext>
+            </a:extLst>
+          </p:cNvPr>
+          <p:cNvSpPr>
+            <a:spLocks noGrp="1" noRot="1" noChangeAspect="1" noMove="1" noResize="1" noEditPoints="1" noAdjustHandles="1" noChangeArrowheads="1" noChangeShapeType="1" noTextEdit="1"/>
+          </p:cNvSpPr>
+          <p:nvPr>
+            <p:extLst>
+              <p:ext uri="{386F3935-93C4-4BCD-93E2-E3B085C9AB24}">
+                <p16:designElem xmlns:p16="http://schemas.microsoft.com/office/powerpoint/2015/main" val="1"/>
+              </p:ext>
+            </p:extLst>
+          </p:nvPr>
+        </p:nvSpPr>
+        <p:spPr>
+          <a:xfrm>
+            <a:off x="0" y="0"/>
+            <a:ext cx="12192000" cy="6858000"/>
+          </a:xfrm>
+          <a:prstGeom prst="rect">
+            <a:avLst/>
+          </a:prstGeom>
+          <a:solidFill>
+            <a:srgbClr val="FFFFFF"/>
+          </a:solidFill>
+          <a:ln>
+            <a:noFill/>
+          </a:ln>
+        </p:spPr>
+        <p:style>
+          <a:lnRef idx="2">
+            <a:schemeClr val="accent1">
+              <a:shade val="50000"/>
+            </a:schemeClr>
+          </a:lnRef>
+          <a:fillRef idx="1">
+            <a:schemeClr val="accent1"/>
+          </a:fillRef>
+          <a:effectRef idx="0">
+            <a:schemeClr val="accent1"/>
+          </a:effectRef>
+          <a:fontRef idx="minor">
+            <a:schemeClr val="lt1"/>
+          </a:fontRef>
+        </p:style>
+        <p:txBody>
+          <a:bodyPr rtlCol="0" anchor="ctr"/>
+          <a:lstStyle/>
+          <a:p>
+            <a:pPr marL="285750" indent="-285750" algn="ctr">
+              <a:buClr>
+                <a:schemeClr val="accent1"/>
+              </a:buClr>
+              <a:buFont typeface="Arial" panose="020B0604020202020204" pitchFamily="34" charset="0"/>
+              <a:buChar char="•"/>
+            </a:pPr>
+            <a:endParaRPr lang="en-US" dirty="0"/>
+          </a:p>
+        </p:txBody>
+      </p:sp>
+      <p:sp>
+        <p:nvSpPr>
+          <p:cNvPr id="10" name="Rectangle 9">
+            <a:extLst>
+              <a:ext uri="{FF2B5EF4-FFF2-40B4-BE49-F238E27FC236}">
+                <a16:creationId xmlns:a16="http://schemas.microsoft.com/office/drawing/2014/main" id="{54516B72-0116-42B2-82A2-B11218A36636}"/>
+              </a:ext>
+              <a:ext uri="{C183D7F6-B498-43B3-948B-1728B52AA6E4}">
+                <adec:decorative xmlns:adec="http://schemas.microsoft.com/office/drawing/2017/decorative" val="1"/>
+              </a:ext>
+            </a:extLst>
+          </p:cNvPr>
+          <p:cNvSpPr>
+            <a:spLocks noGrp="1" noRot="1" noChangeAspect="1" noMove="1" noResize="1" noEditPoints="1" noAdjustHandles="1" noChangeArrowheads="1" noChangeShapeType="1" noTextEdit="1"/>
+          </p:cNvSpPr>
+          <p:nvPr>
+            <p:extLst>
+              <p:ext uri="{386F3935-93C4-4BCD-93E2-E3B085C9AB24}">
+                <p16:designElem xmlns:p16="http://schemas.microsoft.com/office/powerpoint/2015/main" val="1"/>
+              </p:ext>
+            </p:extLst>
+          </p:nvPr>
+        </p:nvSpPr>
+        <p:spPr>
+          <a:xfrm>
+            <a:off x="-1" y="0"/>
+            <a:ext cx="6113191" cy="6858000"/>
+          </a:xfrm>
+          <a:prstGeom prst="rect">
+            <a:avLst/>
+          </a:prstGeom>
+          <a:ln>
+            <a:noFill/>
+          </a:ln>
+        </p:spPr>
+        <p:style>
+          <a:lnRef idx="2">
+            <a:schemeClr val="accent1">
+              <a:shade val="50000"/>
+            </a:schemeClr>
+          </a:lnRef>
+          <a:fillRef idx="1">
+            <a:schemeClr val="accent1"/>
+          </a:fillRef>
+          <a:effectRef idx="0">
+            <a:schemeClr val="accent1"/>
+          </a:effectRef>
+          <a:fontRef idx="minor">
+            <a:schemeClr val="lt1"/>
+          </a:fontRef>
+        </p:style>
+        <p:txBody>
+          <a:bodyPr rtlCol="0" anchor="ctr"/>
+          <a:lstStyle/>
+          <a:p>
+            <a:pPr algn="ctr"/>
+            <a:endParaRPr lang="en-US"/>
+          </a:p>
+        </p:txBody>
+      </p:sp>
+      <p:sp>
+        <p:nvSpPr>
+          <p:cNvPr id="2" name="Title 1">
+            <a:extLst>
+              <a:ext uri="{FF2B5EF4-FFF2-40B4-BE49-F238E27FC236}">
+                <a16:creationId xmlns:a16="http://schemas.microsoft.com/office/drawing/2014/main" id="{1218D4B8-B217-95EA-33ED-C76DCA0CDFA4}"/>
+              </a:ext>
+            </a:extLst>
+          </p:cNvPr>
+          <p:cNvSpPr>
+            <a:spLocks noGrp="1"/>
+          </p:cNvSpPr>
+          <p:nvPr>
+            <p:ph type="title"/>
+          </p:nvPr>
+        </p:nvSpPr>
+        <p:spPr>
+          <a:xfrm>
+            <a:off x="643468" y="1033389"/>
+            <a:ext cx="4826256" cy="4825409"/>
+          </a:xfrm>
+        </p:spPr>
+        <p:txBody>
+          <a:bodyPr anchor="ctr">
+            <a:normAutofit/>
+          </a:bodyPr>
+          <a:lstStyle/>
+          <a:p>
+            <a:r>
+              <a:rPr lang="en-US" sz="5400">
+                <a:solidFill>
+                  <a:srgbClr val="FFFFFF"/>
+                </a:solidFill>
+              </a:rPr>
+              <a:t>What makes A research Question ‘Good’?</a:t>
+            </a:r>
+          </a:p>
+        </p:txBody>
+      </p:sp>
+      <p:sp>
+        <p:nvSpPr>
+          <p:cNvPr id="12" name="Rectangle 11">
+            <a:extLst>
+              <a:ext uri="{FF2B5EF4-FFF2-40B4-BE49-F238E27FC236}">
+                <a16:creationId xmlns:a16="http://schemas.microsoft.com/office/drawing/2014/main" id="{7CDB507F-21B7-4C27-B0FC-D9C465C6DB44}"/>
+              </a:ext>
+              <a:ext uri="{C183D7F6-B498-43B3-948B-1728B52AA6E4}">
+                <adec:decorative xmlns:adec="http://schemas.microsoft.com/office/drawing/2017/decorative" val="1"/>
+              </a:ext>
+            </a:extLst>
+          </p:cNvPr>
+          <p:cNvSpPr>
+            <a:spLocks noGrp="1" noRot="1" noChangeAspect="1" noMove="1" noResize="1" noEditPoints="1" noAdjustHandles="1" noChangeArrowheads="1" noChangeShapeType="1" noTextEdit="1"/>
+          </p:cNvSpPr>
+          <p:nvPr>
+            <p:extLst>
+              <p:ext uri="{386F3935-93C4-4BCD-93E2-E3B085C9AB24}">
+                <p16:designElem xmlns:p16="http://schemas.microsoft.com/office/powerpoint/2015/main" val="1"/>
+              </p:ext>
+            </p:extLst>
+          </p:nvPr>
+        </p:nvSpPr>
+        <p:spPr>
+          <a:xfrm>
+            <a:off x="642579" y="460868"/>
+            <a:ext cx="4828032" cy="111654"/>
+          </a:xfrm>
+          <a:prstGeom prst="rect">
+            <a:avLst/>
+          </a:prstGeom>
+          <a:solidFill>
+            <a:srgbClr val="FFFFFF"/>
+          </a:solidFill>
+          <a:ln>
+            <a:noFill/>
+          </a:ln>
+          <a:effectLst/>
+        </p:spPr>
+        <p:style>
+          <a:lnRef idx="1">
+            <a:schemeClr val="accent1"/>
+          </a:lnRef>
+          <a:fillRef idx="3">
+            <a:schemeClr val="accent1"/>
+          </a:fillRef>
+          <a:effectRef idx="2">
+            <a:schemeClr val="accent1"/>
+          </a:effectRef>
+          <a:fontRef idx="minor">
+            <a:schemeClr val="lt1"/>
+          </a:fontRef>
+        </p:style>
+      </p:sp>
+      <p:sp>
+        <p:nvSpPr>
+          <p:cNvPr id="14" name="Rectangle 13">
+            <a:extLst>
+              <a:ext uri="{FF2B5EF4-FFF2-40B4-BE49-F238E27FC236}">
+                <a16:creationId xmlns:a16="http://schemas.microsoft.com/office/drawing/2014/main" id="{7AB1AE17-B7A3-4363-95CD-25441E2FF1F3}"/>
+              </a:ext>
+              <a:ext uri="{C183D7F6-B498-43B3-948B-1728B52AA6E4}">
+                <adec:decorative xmlns:adec="http://schemas.microsoft.com/office/drawing/2017/decorative" val="1"/>
+              </a:ext>
+            </a:extLst>
+          </p:cNvPr>
+          <p:cNvSpPr>
+            <a:spLocks noGrp="1" noRot="1" noChangeAspect="1" noMove="1" noResize="1" noEditPoints="1" noAdjustHandles="1" noChangeArrowheads="1" noChangeShapeType="1" noTextEdit="1"/>
+          </p:cNvSpPr>
+          <p:nvPr>
+            <p:extLst>
+              <p:ext uri="{386F3935-93C4-4BCD-93E2-E3B085C9AB24}">
+                <p16:designElem xmlns:p16="http://schemas.microsoft.com/office/powerpoint/2015/main" val="1"/>
+              </p:ext>
+            </p:extLst>
+          </p:nvPr>
+        </p:nvSpPr>
+        <p:spPr>
+          <a:xfrm>
+            <a:off x="6782774" y="460868"/>
+            <a:ext cx="4828032" cy="111654"/>
+          </a:xfrm>
+          <a:prstGeom prst="rect">
+            <a:avLst/>
+          </a:prstGeom>
+          <a:solidFill>
+            <a:schemeClr val="accent2"/>
+          </a:solidFill>
+          <a:ln>
+            <a:noFill/>
+          </a:ln>
+          <a:effectLst/>
+        </p:spPr>
+        <p:style>
+          <a:lnRef idx="1">
+            <a:schemeClr val="accent1"/>
+          </a:lnRef>
+          <a:fillRef idx="3">
+            <a:schemeClr val="accent1"/>
+          </a:fillRef>
+          <a:effectRef idx="2">
+            <a:schemeClr val="accent1"/>
+          </a:effectRef>
+          <a:fontRef idx="minor">
+            <a:schemeClr val="lt1"/>
+          </a:fontRef>
+        </p:style>
+      </p:sp>
+      <p:sp>
+        <p:nvSpPr>
+          <p:cNvPr id="3" name="Content Placeholder 2">
+            <a:extLst>
+              <a:ext uri="{FF2B5EF4-FFF2-40B4-BE49-F238E27FC236}">
+                <a16:creationId xmlns:a16="http://schemas.microsoft.com/office/drawing/2014/main" id="{EC3E2053-2CE9-96BE-A25D-C0257F4B641A}"/>
+              </a:ext>
+            </a:extLst>
+          </p:cNvPr>
+          <p:cNvSpPr>
+            <a:spLocks noGrp="1"/>
+          </p:cNvSpPr>
+          <p:nvPr>
+            <p:ph idx="1"/>
+          </p:nvPr>
+        </p:nvSpPr>
+        <p:spPr>
+          <a:xfrm>
+            <a:off x="6755769" y="1033390"/>
+            <a:ext cx="4855037" cy="4825409"/>
+          </a:xfrm>
+          <a:ln w="57150">
+            <a:noFill/>
+          </a:ln>
+        </p:spPr>
+        <p:txBody>
+          <a:bodyPr anchor="ctr">
+            <a:normAutofit/>
+          </a:bodyPr>
+          <a:lstStyle/>
+          <a:p>
+            <a:pPr>
+              <a:spcBef>
+                <a:spcPct val="50000"/>
+              </a:spcBef>
+              <a:buFont typeface="Symbol" charset="0"/>
+              <a:buNone/>
+              <a:defRPr/>
+            </a:pPr>
+            <a:r>
+              <a:rPr lang="en-US" sz="1900" b="1">
+                <a:solidFill>
+                  <a:schemeClr val="accent2">
+                    <a:lumMod val="50000"/>
+                  </a:schemeClr>
+                </a:solidFill>
+                <a:ea typeface="ＭＳ Ｐゴシック" charset="0"/>
+                <a:cs typeface="Times New Roman" charset="0"/>
+              </a:rPr>
+              <a:t>1. </a:t>
+            </a:r>
+            <a:r>
+              <a:rPr lang="en-US" sz="1900" b="1" u="sng">
+                <a:solidFill>
+                  <a:schemeClr val="accent2">
+                    <a:lumMod val="50000"/>
+                  </a:schemeClr>
+                </a:solidFill>
+                <a:ea typeface="ＭＳ Ｐゴシック" charset="0"/>
+                <a:cs typeface="Times New Roman" charset="0"/>
+              </a:rPr>
+              <a:t>Feasibility</a:t>
+            </a:r>
+            <a:r>
+              <a:rPr lang="en-US" sz="1900" b="1">
+                <a:solidFill>
+                  <a:schemeClr val="accent2">
+                    <a:lumMod val="50000"/>
+                  </a:schemeClr>
+                </a:solidFill>
+                <a:ea typeface="ＭＳ Ｐゴシック" charset="0"/>
+                <a:cs typeface="Times New Roman" charset="0"/>
+              </a:rPr>
+              <a:t>: Can you start and finish an investigation of your research question with the resources that you can obtain and in the time that is available?</a:t>
+            </a:r>
+          </a:p>
+          <a:p>
+            <a:pPr>
+              <a:spcBef>
+                <a:spcPct val="50000"/>
+              </a:spcBef>
+              <a:buFont typeface="Symbol" charset="0"/>
+              <a:buNone/>
+              <a:defRPr/>
+            </a:pPr>
+            <a:r>
+              <a:rPr lang="en-US" sz="1900" b="1">
+                <a:solidFill>
+                  <a:schemeClr val="accent2">
+                    <a:lumMod val="50000"/>
+                  </a:schemeClr>
+                </a:solidFill>
+                <a:ea typeface="ＭＳ Ｐゴシック" charset="0"/>
+                <a:cs typeface="Times New Roman" charset="0"/>
+              </a:rPr>
+              <a:t>2. </a:t>
+            </a:r>
+            <a:r>
+              <a:rPr lang="en-US" sz="1900" b="1" u="sng">
+                <a:solidFill>
+                  <a:schemeClr val="accent2">
+                    <a:lumMod val="50000"/>
+                  </a:schemeClr>
+                </a:solidFill>
+                <a:ea typeface="ＭＳ Ｐゴシック" charset="0"/>
+                <a:cs typeface="Times New Roman" charset="0"/>
+              </a:rPr>
+              <a:t>Social Importance</a:t>
+            </a:r>
+            <a:r>
+              <a:rPr lang="en-US" sz="1900" b="1">
+                <a:solidFill>
+                  <a:schemeClr val="accent2">
+                    <a:lumMod val="50000"/>
+                  </a:schemeClr>
+                </a:solidFill>
+                <a:ea typeface="ＭＳ Ｐゴシック" charset="0"/>
+                <a:cs typeface="Times New Roman" charset="0"/>
+              </a:rPr>
+              <a:t>: Will an answer to your research question make a difference in the social world, even if that is only in terms of helping people understand a problem they consider important? </a:t>
+            </a:r>
+          </a:p>
+          <a:p>
+            <a:pPr>
+              <a:spcBef>
+                <a:spcPct val="50000"/>
+              </a:spcBef>
+              <a:buFont typeface="Symbol" charset="0"/>
+              <a:buNone/>
+              <a:defRPr/>
+            </a:pPr>
+            <a:r>
+              <a:rPr lang="en-US" sz="1900" b="1">
+                <a:solidFill>
+                  <a:schemeClr val="accent2">
+                    <a:lumMod val="50000"/>
+                  </a:schemeClr>
+                </a:solidFill>
+                <a:ea typeface="ＭＳ Ｐゴシック" charset="0"/>
+                <a:cs typeface="Times New Roman" charset="0"/>
+              </a:rPr>
+              <a:t>3. </a:t>
+            </a:r>
+            <a:r>
+              <a:rPr lang="en-US" sz="1900" b="1" u="sng">
+                <a:solidFill>
+                  <a:schemeClr val="accent2">
+                    <a:lumMod val="50000"/>
+                  </a:schemeClr>
+                </a:solidFill>
+                <a:ea typeface="ＭＳ Ｐゴシック" charset="0"/>
+                <a:cs typeface="Times New Roman" charset="0"/>
+              </a:rPr>
+              <a:t>Scientific Relevance</a:t>
+            </a:r>
+            <a:r>
+              <a:rPr lang="en-US" sz="1900" b="1">
+                <a:solidFill>
+                  <a:schemeClr val="accent2">
+                    <a:lumMod val="50000"/>
+                  </a:schemeClr>
+                </a:solidFill>
+                <a:ea typeface="ＭＳ Ｐゴシック" charset="0"/>
+                <a:cs typeface="Times New Roman" charset="0"/>
+              </a:rPr>
+              <a:t>: Does your research question help to resolve some contradictory research findings or a puzzling issue in social theory?  </a:t>
+            </a:r>
+          </a:p>
+        </p:txBody>
+      </p:sp>
+      <p:sp>
+        <p:nvSpPr>
+          <p:cNvPr id="4" name="TextBox 3">
+            <a:extLst>
+              <a:ext uri="{FF2B5EF4-FFF2-40B4-BE49-F238E27FC236}">
+                <a16:creationId xmlns:a16="http://schemas.microsoft.com/office/drawing/2014/main" id="{D487536C-52E2-1D45-8E78-4C411E9DE07C}"/>
+              </a:ext>
+            </a:extLst>
+          </p:cNvPr>
+          <p:cNvSpPr txBox="1"/>
+          <p:nvPr/>
+        </p:nvSpPr>
+        <p:spPr>
+          <a:xfrm>
+            <a:off x="9473114" y="6550223"/>
+            <a:ext cx="2718886" cy="307777"/>
+          </a:xfrm>
+          <a:prstGeom prst="rect">
+            <a:avLst/>
+          </a:prstGeom>
+          <a:noFill/>
+        </p:spPr>
+        <p:txBody>
+          <a:bodyPr wrap="none" rtlCol="0">
+            <a:spAutoFit/>
+          </a:bodyPr>
+          <a:lstStyle/>
+          <a:p>
+            <a:r>
+              <a:rPr lang="en-US" sz="1400" b="1" dirty="0">
+                <a:solidFill>
+                  <a:srgbClr val="000000"/>
+                </a:solidFill>
+                <a:ea typeface="ＭＳ Ｐゴシック" charset="0"/>
+                <a:cs typeface="Times New Roman" charset="0"/>
+              </a:rPr>
+              <a:t>(King, Keohane, &amp; </a:t>
+            </a:r>
+            <a:r>
+              <a:rPr lang="en-US" sz="1400" b="1" dirty="0" err="1">
+                <a:solidFill>
+                  <a:srgbClr val="000000"/>
+                </a:solidFill>
+                <a:ea typeface="ＭＳ Ｐゴシック" charset="0"/>
+                <a:cs typeface="Times New Roman" charset="0"/>
+              </a:rPr>
+              <a:t>Verba</a:t>
+            </a:r>
+            <a:r>
+              <a:rPr lang="en-US" sz="1400" b="1" dirty="0">
+                <a:solidFill>
+                  <a:srgbClr val="000000"/>
+                </a:solidFill>
+                <a:ea typeface="ＭＳ Ｐゴシック" charset="0"/>
+                <a:cs typeface="Times New Roman" charset="0"/>
+              </a:rPr>
+              <a:t>, 1994)</a:t>
+            </a:r>
+          </a:p>
+        </p:txBody>
+      </p:sp>
+    </p:spTree>
+    <p:extLst>
+      <p:ext uri="{BB962C8B-B14F-4D97-AF65-F5344CB8AC3E}">
+        <p14:creationId xmlns:p14="http://schemas.microsoft.com/office/powerpoint/2010/main" val="1248193097"/>
+      </p:ext>
+    </p:extLst>
+  </p:cSld>
+  <p:clrMapOvr>
+    <a:masterClrMapping/>
+  </p:clrMapOvr>
+</p:sld>
+</file>
+
+<file path=ppt/slides/slide11.xml><?xml version="1.0" encoding="utf-8"?>
+<p:sld xmlns:a="http://schemas.openxmlformats.org/drawingml/2006/main" xmlns:r="http://schemas.openxmlformats.org/officeDocument/2006/relationships" xmlns:p="http://schemas.openxmlformats.org/presentationml/2006/main">
+  <p:cSld>
     <p:spTree>
       <p:nvGrpSpPr>
         <p:cNvPr id="1" name=""/>
@@ -37014,7 +37560,7 @@
 </p:sld>
 </file>
 
-<file path=ppt/slides/slide11.xml><?xml version="1.0" encoding="utf-8"?>
+<file path=ppt/slides/slide12.xml><?xml version="1.0" encoding="utf-8"?>
 <p:sld xmlns:a="http://schemas.openxmlformats.org/drawingml/2006/main" xmlns:r="http://schemas.openxmlformats.org/officeDocument/2006/relationships" xmlns:p="http://schemas.openxmlformats.org/presentationml/2006/main">
   <p:cSld>
     <p:spTree>
@@ -37132,7 +37678,7 @@
 </p:sld>
 </file>
 
-<file path=ppt/slides/slide12.xml><?xml version="1.0" encoding="utf-8"?>
+<file path=ppt/slides/slide13.xml><?xml version="1.0" encoding="utf-8"?>
 <p:sld xmlns:a="http://schemas.openxmlformats.org/drawingml/2006/main" xmlns:r="http://schemas.openxmlformats.org/officeDocument/2006/relationships" xmlns:p="http://schemas.openxmlformats.org/presentationml/2006/main">
   <p:cSld>
     <p:spTree>
@@ -37240,7 +37786,7 @@
 </p:sld>
 </file>
 
-<file path=ppt/slides/slide13.xml><?xml version="1.0" encoding="utf-8"?>
+<file path=ppt/slides/slide14.xml><?xml version="1.0" encoding="utf-8"?>
 <p:sld xmlns:a="http://schemas.openxmlformats.org/drawingml/2006/main" xmlns:r="http://schemas.openxmlformats.org/officeDocument/2006/relationships" xmlns:p="http://schemas.openxmlformats.org/presentationml/2006/main">
   <p:cSld>
     <p:spTree>
@@ -37344,7 +37890,7 @@
 </p:sld>
 </file>
 
-<file path=ppt/slides/slide14.xml><?xml version="1.0" encoding="utf-8"?>
+<file path=ppt/slides/slide15.xml><?xml version="1.0" encoding="utf-8"?>
 <p:sld xmlns:a="http://schemas.openxmlformats.org/drawingml/2006/main" xmlns:r="http://schemas.openxmlformats.org/officeDocument/2006/relationships" xmlns:p="http://schemas.openxmlformats.org/presentationml/2006/main">
   <p:cSld>
     <p:spTree>
@@ -37463,7 +38009,7 @@
 </p:sld>
 </file>
 
-<file path=ppt/slides/slide15.xml><?xml version="1.0" encoding="utf-8"?>
+<file path=ppt/slides/slide16.xml><?xml version="1.0" encoding="utf-8"?>
 <p:sld xmlns:a="http://schemas.openxmlformats.org/drawingml/2006/main" xmlns:r="http://schemas.openxmlformats.org/officeDocument/2006/relationships" xmlns:p="http://schemas.openxmlformats.org/presentationml/2006/main">
   <p:cSld>
     <p:spTree>
@@ -37608,7 +38154,7 @@
 </p:sld>
 </file>
 
-<file path=ppt/slides/slide16.xml><?xml version="1.0" encoding="utf-8"?>
+<file path=ppt/slides/slide17.xml><?xml version="1.0" encoding="utf-8"?>
 <p:sld xmlns:a="http://schemas.openxmlformats.org/drawingml/2006/main" xmlns:r="http://schemas.openxmlformats.org/officeDocument/2006/relationships" xmlns:p="http://schemas.openxmlformats.org/presentationml/2006/main">
   <p:cSld>
     <p:spTree>
@@ -37753,7 +38299,7 @@
 </p:sld>
 </file>
 
-<file path=ppt/slides/slide17.xml><?xml version="1.0" encoding="utf-8"?>
+<file path=ppt/slides/slide18.xml><?xml version="1.0" encoding="utf-8"?>
 <p:sld xmlns:a="http://schemas.openxmlformats.org/drawingml/2006/main" xmlns:r="http://schemas.openxmlformats.org/officeDocument/2006/relationships" xmlns:p="http://schemas.openxmlformats.org/presentationml/2006/main">
   <p:cSld>
     <p:spTree>
@@ -37898,7 +38444,7 @@
 </p:sld>
 </file>
 
-<file path=ppt/slides/slide18.xml><?xml version="1.0" encoding="utf-8"?>
+<file path=ppt/slides/slide19.xml><?xml version="1.0" encoding="utf-8"?>
 <p:sld xmlns:a="http://schemas.openxmlformats.org/drawingml/2006/main" xmlns:r="http://schemas.openxmlformats.org/officeDocument/2006/relationships" xmlns:p="http://schemas.openxmlformats.org/presentationml/2006/main">
   <p:cSld>
     <p:spTree>
@@ -38043,7 +38589,123 @@
 </p:sld>
 </file>
 
-<file path=ppt/slides/slide19.xml><?xml version="1.0" encoding="utf-8"?>
+<file path=ppt/slides/slide2.xml><?xml version="1.0" encoding="utf-8"?>
+<p:sld xmlns:a="http://schemas.openxmlformats.org/drawingml/2006/main" xmlns:r="http://schemas.openxmlformats.org/officeDocument/2006/relationships" xmlns:p="http://schemas.openxmlformats.org/presentationml/2006/main">
+  <p:cSld>
+    <p:spTree>
+      <p:nvGrpSpPr>
+        <p:cNvPr id="1" name=""/>
+        <p:cNvGrpSpPr/>
+        <p:nvPr/>
+      </p:nvGrpSpPr>
+      <p:grpSpPr>
+        <a:xfrm>
+          <a:off x="0" y="0"/>
+          <a:ext cx="0" cy="0"/>
+          <a:chOff x="0" y="0"/>
+          <a:chExt cx="0" cy="0"/>
+        </a:xfrm>
+      </p:grpSpPr>
+      <p:sp>
+        <p:nvSpPr>
+          <p:cNvPr id="2" name="Title 1">
+            <a:extLst>
+              <a:ext uri="{FF2B5EF4-FFF2-40B4-BE49-F238E27FC236}">
+                <a16:creationId xmlns:a16="http://schemas.microsoft.com/office/drawing/2014/main" id="{1D820E45-7ED4-5604-32C0-20BAC70F00A7}"/>
+              </a:ext>
+            </a:extLst>
+          </p:cNvPr>
+          <p:cNvSpPr>
+            <a:spLocks noGrp="1"/>
+          </p:cNvSpPr>
+          <p:nvPr>
+            <p:ph type="title"/>
+          </p:nvPr>
+        </p:nvSpPr>
+        <p:spPr/>
+        <p:txBody>
+          <a:bodyPr/>
+          <a:lstStyle/>
+          <a:p>
+            <a:r>
+              <a:rPr lang="en-US" dirty="0"/>
+              <a:t>Outline</a:t>
+            </a:r>
+          </a:p>
+        </p:txBody>
+      </p:sp>
+      <p:sp>
+        <p:nvSpPr>
+          <p:cNvPr id="3" name="Content Placeholder 2">
+            <a:extLst>
+              <a:ext uri="{FF2B5EF4-FFF2-40B4-BE49-F238E27FC236}">
+                <a16:creationId xmlns:a16="http://schemas.microsoft.com/office/drawing/2014/main" id="{049E0EAC-31AB-FF98-EE31-87F367908094}"/>
+              </a:ext>
+            </a:extLst>
+          </p:cNvPr>
+          <p:cNvSpPr>
+            <a:spLocks noGrp="1"/>
+          </p:cNvSpPr>
+          <p:nvPr>
+            <p:ph idx="1"/>
+          </p:nvPr>
+        </p:nvSpPr>
+        <p:spPr/>
+        <p:txBody>
+          <a:bodyPr/>
+          <a:lstStyle/>
+          <a:p>
+            <a:r>
+              <a:rPr lang="en-US" dirty="0"/>
+              <a:t>Lab 2 discussion</a:t>
+            </a:r>
+          </a:p>
+          <a:p>
+            <a:r>
+              <a:rPr lang="en-US" dirty="0"/>
+              <a:t>Research Question Overview</a:t>
+            </a:r>
+          </a:p>
+          <a:p>
+            <a:r>
+              <a:rPr lang="en-US" dirty="0"/>
+              <a:t>Good/Bad Research Questions </a:t>
+            </a:r>
+          </a:p>
+          <a:p>
+            <a:r>
+              <a:rPr lang="en-US" dirty="0"/>
+              <a:t>How to brainstorm research questions </a:t>
+            </a:r>
+          </a:p>
+          <a:p>
+            <a:r>
+              <a:rPr lang="en-US" dirty="0"/>
+              <a:t>Research Question Assignment</a:t>
+            </a:r>
+          </a:p>
+          <a:p>
+            <a:endParaRPr lang="en-US" dirty="0"/>
+          </a:p>
+          <a:p>
+            <a:endParaRPr lang="en-US" dirty="0"/>
+          </a:p>
+        </p:txBody>
+      </p:sp>
+    </p:spTree>
+    <p:extLst>
+      <p:ext uri="{BB962C8B-B14F-4D97-AF65-F5344CB8AC3E}">
+        <p14:creationId xmlns:p14="http://schemas.microsoft.com/office/powerpoint/2010/main" val="1045368036"/>
+      </p:ext>
+    </p:extLst>
+  </p:cSld>
+  <p:clrMapOvr>
+    <a:masterClrMapping/>
+  </p:clrMapOvr>
+</p:sld>
+</file>
+
+<file path=ppt/slides/slide20.xml><?xml version="1.0" encoding="utf-8"?>
 <p:sld xmlns:a="http://schemas.openxmlformats.org/drawingml/2006/main" xmlns:r="http://schemas.openxmlformats.org/officeDocument/2006/relationships" xmlns:p="http://schemas.openxmlformats.org/presentationml/2006/main">
   <p:cSld>
     <p:spTree>
@@ -38186,7 +38848,998 @@
 </p:sld>
 </file>
 
-<file path=ppt/slides/slide2.xml><?xml version="1.0" encoding="utf-8"?>
+<file path=ppt/slides/slide21.xml><?xml version="1.0" encoding="utf-8"?>
+<p:sld xmlns:a="http://schemas.openxmlformats.org/drawingml/2006/main" xmlns:r="http://schemas.openxmlformats.org/officeDocument/2006/relationships" xmlns:p="http://schemas.openxmlformats.org/presentationml/2006/main">
+  <p:cSld>
+    <p:bg>
+      <p:bgPr>
+        <a:solidFill>
+          <a:schemeClr val="bg1"/>
+        </a:solidFill>
+        <a:effectLst/>
+      </p:bgPr>
+    </p:bg>
+    <p:spTree>
+      <p:nvGrpSpPr>
+        <p:cNvPr id="1" name=""/>
+        <p:cNvGrpSpPr/>
+        <p:nvPr/>
+      </p:nvGrpSpPr>
+      <p:grpSpPr>
+        <a:xfrm>
+          <a:off x="0" y="0"/>
+          <a:ext cx="0" cy="0"/>
+          <a:chOff x="0" y="0"/>
+          <a:chExt cx="0" cy="0"/>
+        </a:xfrm>
+      </p:grpSpPr>
+      <p:sp>
+        <p:nvSpPr>
+          <p:cNvPr id="2" name="Title 1">
+            <a:extLst>
+              <a:ext uri="{FF2B5EF4-FFF2-40B4-BE49-F238E27FC236}">
+                <a16:creationId xmlns:a16="http://schemas.microsoft.com/office/drawing/2014/main" id="{9F9B55E7-E579-439B-166C-17A7423B42D9}"/>
+              </a:ext>
+            </a:extLst>
+          </p:cNvPr>
+          <p:cNvSpPr>
+            <a:spLocks noGrp="1"/>
+          </p:cNvSpPr>
+          <p:nvPr>
+            <p:ph type="title"/>
+          </p:nvPr>
+        </p:nvSpPr>
+        <p:spPr>
+          <a:xfrm>
+            <a:off x="581192" y="702156"/>
+            <a:ext cx="11029616" cy="1013800"/>
+          </a:xfrm>
+        </p:spPr>
+        <p:txBody>
+          <a:bodyPr>
+            <a:normAutofit/>
+          </a:bodyPr>
+          <a:lstStyle/>
+          <a:p>
+            <a:r>
+              <a:rPr lang="en-US">
+                <a:solidFill>
+                  <a:srgbClr val="FFFEFF"/>
+                </a:solidFill>
+              </a:rPr>
+              <a:t>Research Question form</a:t>
+            </a:r>
+          </a:p>
+        </p:txBody>
+      </p:sp>
+      <p:graphicFrame>
+        <p:nvGraphicFramePr>
+          <p:cNvPr id="6" name="Content Placeholder 2">
+            <a:extLst>
+              <a:ext uri="{FF2B5EF4-FFF2-40B4-BE49-F238E27FC236}">
+                <a16:creationId xmlns:a16="http://schemas.microsoft.com/office/drawing/2014/main" id="{805F57EF-0D00-3607-CA44-AFCBDE4E5AED}"/>
+              </a:ext>
+            </a:extLst>
+          </p:cNvPr>
+          <p:cNvGraphicFramePr>
+            <a:graphicFrameLocks noGrp="1"/>
+          </p:cNvGraphicFramePr>
+          <p:nvPr>
+            <p:ph idx="1"/>
+            <p:extLst>
+              <p:ext uri="{D42A27DB-BD31-4B8C-83A1-F6EECF244321}">
+                <p14:modId xmlns:p14="http://schemas.microsoft.com/office/powerpoint/2010/main" val="3360743163"/>
+              </p:ext>
+            </p:extLst>
+          </p:nvPr>
+        </p:nvGraphicFramePr>
+        <p:xfrm>
+          <a:off x="581025" y="2181225"/>
+          <a:ext cx="11029950" cy="3678238"/>
+        </p:xfrm>
+        <a:graphic>
+          <a:graphicData uri="http://schemas.openxmlformats.org/drawingml/2006/diagram">
+            <dgm:relIds xmlns:dgm="http://schemas.openxmlformats.org/drawingml/2006/diagram" xmlns:r="http://schemas.openxmlformats.org/officeDocument/2006/relationships" r:dm="rId2" r:lo="rId3" r:qs="rId4" r:cs="rId5"/>
+          </a:graphicData>
+        </a:graphic>
+      </p:graphicFrame>
+    </p:spTree>
+    <p:extLst>
+      <p:ext uri="{BB962C8B-B14F-4D97-AF65-F5344CB8AC3E}">
+        <p14:creationId xmlns:p14="http://schemas.microsoft.com/office/powerpoint/2010/main" val="1938461915"/>
+      </p:ext>
+    </p:extLst>
+  </p:cSld>
+  <p:clrMapOvr>
+    <a:masterClrMapping/>
+  </p:clrMapOvr>
+</p:sld>
+</file>
+
+<file path=ppt/slides/slide22.xml><?xml version="1.0" encoding="utf-8"?>
+<p:sld xmlns:a="http://schemas.openxmlformats.org/drawingml/2006/main" xmlns:r="http://schemas.openxmlformats.org/officeDocument/2006/relationships" xmlns:p="http://schemas.openxmlformats.org/presentationml/2006/main">
+  <p:cSld>
+    <p:spTree>
+      <p:nvGrpSpPr>
+        <p:cNvPr id="1" name=""/>
+        <p:cNvGrpSpPr/>
+        <p:nvPr/>
+      </p:nvGrpSpPr>
+      <p:grpSpPr>
+        <a:xfrm>
+          <a:off x="0" y="0"/>
+          <a:ext cx="0" cy="0"/>
+          <a:chOff x="0" y="0"/>
+          <a:chExt cx="0" cy="0"/>
+        </a:xfrm>
+      </p:grpSpPr>
+      <p:sp>
+        <p:nvSpPr>
+          <p:cNvPr id="2" name="Title 1">
+            <a:extLst>
+              <a:ext uri="{FF2B5EF4-FFF2-40B4-BE49-F238E27FC236}">
+                <a16:creationId xmlns:a16="http://schemas.microsoft.com/office/drawing/2014/main" id="{426BD9DA-40C7-C2A6-C60C-90341087CF31}"/>
+              </a:ext>
+            </a:extLst>
+          </p:cNvPr>
+          <p:cNvSpPr>
+            <a:spLocks noGrp="1"/>
+          </p:cNvSpPr>
+          <p:nvPr>
+            <p:ph type="title"/>
+          </p:nvPr>
+        </p:nvSpPr>
+        <p:spPr/>
+        <p:txBody>
+          <a:bodyPr/>
+          <a:lstStyle/>
+          <a:p>
+            <a:r>
+              <a:rPr lang="en-US" dirty="0"/>
+              <a:t>Example From Boyle &amp; McKinzie</a:t>
+            </a:r>
+          </a:p>
+        </p:txBody>
+      </p:sp>
+      <p:graphicFrame>
+        <p:nvGraphicFramePr>
+          <p:cNvPr id="4" name="Content Placeholder 3">
+            <a:extLst>
+              <a:ext uri="{FF2B5EF4-FFF2-40B4-BE49-F238E27FC236}">
+                <a16:creationId xmlns:a16="http://schemas.microsoft.com/office/drawing/2014/main" id="{880D736B-8CF0-CA1C-BA6C-6B15D636B54E}"/>
+              </a:ext>
+            </a:extLst>
+          </p:cNvPr>
+          <p:cNvGraphicFramePr>
+            <a:graphicFrameLocks noGrp="1"/>
+          </p:cNvGraphicFramePr>
+          <p:nvPr>
+            <p:ph idx="1"/>
+            <p:extLst>
+              <p:ext uri="{D42A27DB-BD31-4B8C-83A1-F6EECF244321}">
+                <p14:modId xmlns:p14="http://schemas.microsoft.com/office/powerpoint/2010/main" val="3967671196"/>
+              </p:ext>
+            </p:extLst>
+          </p:nvPr>
+        </p:nvGraphicFramePr>
+        <p:xfrm>
+          <a:off x="581192" y="2180496"/>
+          <a:ext cx="11029615" cy="3678303"/>
+        </p:xfrm>
+        <a:graphic>
+          <a:graphicData uri="http://schemas.openxmlformats.org/drawingml/2006/diagram">
+            <dgm:relIds xmlns:dgm="http://schemas.openxmlformats.org/drawingml/2006/diagram" xmlns:r="http://schemas.openxmlformats.org/officeDocument/2006/relationships" r:dm="rId2" r:lo="rId3" r:qs="rId4" r:cs="rId5"/>
+          </a:graphicData>
+        </a:graphic>
+      </p:graphicFrame>
+    </p:spTree>
+    <p:extLst>
+      <p:ext uri="{BB962C8B-B14F-4D97-AF65-F5344CB8AC3E}">
+        <p14:creationId xmlns:p14="http://schemas.microsoft.com/office/powerpoint/2010/main" val="1547504072"/>
+      </p:ext>
+    </p:extLst>
+  </p:cSld>
+  <p:clrMapOvr>
+    <a:masterClrMapping/>
+  </p:clrMapOvr>
+</p:sld>
+</file>
+
+<file path=ppt/slides/slide23.xml><?xml version="1.0" encoding="utf-8"?>
+<p:sld xmlns:a="http://schemas.openxmlformats.org/drawingml/2006/main" xmlns:r="http://schemas.openxmlformats.org/officeDocument/2006/relationships" xmlns:p="http://schemas.openxmlformats.org/presentationml/2006/main">
+  <p:cSld>
+    <p:spTree>
+      <p:nvGrpSpPr>
+        <p:cNvPr id="1" name=""/>
+        <p:cNvGrpSpPr/>
+        <p:nvPr/>
+      </p:nvGrpSpPr>
+      <p:grpSpPr>
+        <a:xfrm>
+          <a:off x="0" y="0"/>
+          <a:ext cx="0" cy="0"/>
+          <a:chOff x="0" y="0"/>
+          <a:chExt cx="0" cy="0"/>
+        </a:xfrm>
+      </p:grpSpPr>
+      <p:sp>
+        <p:nvSpPr>
+          <p:cNvPr id="2" name="Title 1">
+            <a:extLst>
+              <a:ext uri="{FF2B5EF4-FFF2-40B4-BE49-F238E27FC236}">
+                <a16:creationId xmlns:a16="http://schemas.microsoft.com/office/drawing/2014/main" id="{426BD9DA-40C7-C2A6-C60C-90341087CF31}"/>
+              </a:ext>
+            </a:extLst>
+          </p:cNvPr>
+          <p:cNvSpPr>
+            <a:spLocks noGrp="1"/>
+          </p:cNvSpPr>
+          <p:nvPr>
+            <p:ph type="title"/>
+          </p:nvPr>
+        </p:nvSpPr>
+        <p:spPr/>
+        <p:txBody>
+          <a:bodyPr/>
+          <a:lstStyle/>
+          <a:p>
+            <a:r>
+              <a:rPr lang="en-US" dirty="0"/>
+              <a:t>Example Question</a:t>
+            </a:r>
+          </a:p>
+        </p:txBody>
+      </p:sp>
+      <p:graphicFrame>
+        <p:nvGraphicFramePr>
+          <p:cNvPr id="4" name="Content Placeholder 3">
+            <a:extLst>
+              <a:ext uri="{FF2B5EF4-FFF2-40B4-BE49-F238E27FC236}">
+                <a16:creationId xmlns:a16="http://schemas.microsoft.com/office/drawing/2014/main" id="{880D736B-8CF0-CA1C-BA6C-6B15D636B54E}"/>
+              </a:ext>
+            </a:extLst>
+          </p:cNvPr>
+          <p:cNvGraphicFramePr>
+            <a:graphicFrameLocks noGrp="1"/>
+          </p:cNvGraphicFramePr>
+          <p:nvPr>
+            <p:ph idx="1"/>
+            <p:extLst>
+              <p:ext uri="{D42A27DB-BD31-4B8C-83A1-F6EECF244321}">
+                <p14:modId xmlns:p14="http://schemas.microsoft.com/office/powerpoint/2010/main" val="2188152511"/>
+              </p:ext>
+            </p:extLst>
+          </p:nvPr>
+        </p:nvGraphicFramePr>
+        <p:xfrm>
+          <a:off x="581192" y="2180496"/>
+          <a:ext cx="11029615" cy="3678303"/>
+        </p:xfrm>
+        <a:graphic>
+          <a:graphicData uri="http://schemas.openxmlformats.org/drawingml/2006/diagram">
+            <dgm:relIds xmlns:dgm="http://schemas.openxmlformats.org/drawingml/2006/diagram" xmlns:r="http://schemas.openxmlformats.org/officeDocument/2006/relationships" r:dm="rId2" r:lo="rId3" r:qs="rId4" r:cs="rId5"/>
+          </a:graphicData>
+        </a:graphic>
+      </p:graphicFrame>
+    </p:spTree>
+    <p:extLst>
+      <p:ext uri="{BB962C8B-B14F-4D97-AF65-F5344CB8AC3E}">
+        <p14:creationId xmlns:p14="http://schemas.microsoft.com/office/powerpoint/2010/main" val="606178700"/>
+      </p:ext>
+    </p:extLst>
+  </p:cSld>
+  <p:clrMapOvr>
+    <a:masterClrMapping/>
+  </p:clrMapOvr>
+</p:sld>
+</file>
+
+<file path=ppt/slides/slide24.xml><?xml version="1.0" encoding="utf-8"?>
+<p:sld xmlns:a="http://schemas.openxmlformats.org/drawingml/2006/main" xmlns:r="http://schemas.openxmlformats.org/officeDocument/2006/relationships" xmlns:p="http://schemas.openxmlformats.org/presentationml/2006/main">
+  <p:cSld>
+    <p:spTree>
+      <p:nvGrpSpPr>
+        <p:cNvPr id="1" name=""/>
+        <p:cNvGrpSpPr/>
+        <p:nvPr/>
+      </p:nvGrpSpPr>
+      <p:grpSpPr>
+        <a:xfrm>
+          <a:off x="0" y="0"/>
+          <a:ext cx="0" cy="0"/>
+          <a:chOff x="0" y="0"/>
+          <a:chExt cx="0" cy="0"/>
+        </a:xfrm>
+      </p:grpSpPr>
+      <p:sp>
+        <p:nvSpPr>
+          <p:cNvPr id="2" name="Title 1">
+            <a:extLst>
+              <a:ext uri="{FF2B5EF4-FFF2-40B4-BE49-F238E27FC236}">
+                <a16:creationId xmlns:a16="http://schemas.microsoft.com/office/drawing/2014/main" id="{426BD9DA-40C7-C2A6-C60C-90341087CF31}"/>
+              </a:ext>
+            </a:extLst>
+          </p:cNvPr>
+          <p:cNvSpPr>
+            <a:spLocks noGrp="1"/>
+          </p:cNvSpPr>
+          <p:nvPr>
+            <p:ph type="title"/>
+          </p:nvPr>
+        </p:nvSpPr>
+        <p:spPr/>
+        <p:txBody>
+          <a:bodyPr/>
+          <a:lstStyle/>
+          <a:p>
+            <a:r>
+              <a:rPr lang="en-US" dirty="0"/>
+              <a:t>How can We fix it?</a:t>
+            </a:r>
+          </a:p>
+        </p:txBody>
+      </p:sp>
+      <p:graphicFrame>
+        <p:nvGraphicFramePr>
+          <p:cNvPr id="4" name="Content Placeholder 3">
+            <a:extLst>
+              <a:ext uri="{FF2B5EF4-FFF2-40B4-BE49-F238E27FC236}">
+                <a16:creationId xmlns:a16="http://schemas.microsoft.com/office/drawing/2014/main" id="{880D736B-8CF0-CA1C-BA6C-6B15D636B54E}"/>
+              </a:ext>
+            </a:extLst>
+          </p:cNvPr>
+          <p:cNvGraphicFramePr>
+            <a:graphicFrameLocks noGrp="1"/>
+          </p:cNvGraphicFramePr>
+          <p:nvPr>
+            <p:ph idx="1"/>
+            <p:extLst>
+              <p:ext uri="{D42A27DB-BD31-4B8C-83A1-F6EECF244321}">
+                <p14:modId xmlns:p14="http://schemas.microsoft.com/office/powerpoint/2010/main" val="3853451629"/>
+              </p:ext>
+            </p:extLst>
+          </p:nvPr>
+        </p:nvGraphicFramePr>
+        <p:xfrm>
+          <a:off x="581192" y="2180496"/>
+          <a:ext cx="11029615" cy="3678303"/>
+        </p:xfrm>
+        <a:graphic>
+          <a:graphicData uri="http://schemas.openxmlformats.org/drawingml/2006/diagram">
+            <dgm:relIds xmlns:dgm="http://schemas.openxmlformats.org/drawingml/2006/diagram" xmlns:r="http://schemas.openxmlformats.org/officeDocument/2006/relationships" r:dm="rId2" r:lo="rId3" r:qs="rId4" r:cs="rId5"/>
+          </a:graphicData>
+        </a:graphic>
+      </p:graphicFrame>
+    </p:spTree>
+    <p:extLst>
+      <p:ext uri="{BB962C8B-B14F-4D97-AF65-F5344CB8AC3E}">
+        <p14:creationId xmlns:p14="http://schemas.microsoft.com/office/powerpoint/2010/main" val="2053671706"/>
+      </p:ext>
+    </p:extLst>
+  </p:cSld>
+  <p:clrMapOvr>
+    <a:masterClrMapping/>
+  </p:clrMapOvr>
+</p:sld>
+</file>
+
+<file path=ppt/slides/slide25.xml><?xml version="1.0" encoding="utf-8"?>
+<p:sld xmlns:a="http://schemas.openxmlformats.org/drawingml/2006/main" xmlns:r="http://schemas.openxmlformats.org/officeDocument/2006/relationships" xmlns:p="http://schemas.openxmlformats.org/presentationml/2006/main">
+  <p:cSld>
+    <p:spTree>
+      <p:nvGrpSpPr>
+        <p:cNvPr id="1" name=""/>
+        <p:cNvGrpSpPr/>
+        <p:nvPr/>
+      </p:nvGrpSpPr>
+      <p:grpSpPr>
+        <a:xfrm>
+          <a:off x="0" y="0"/>
+          <a:ext cx="0" cy="0"/>
+          <a:chOff x="0" y="0"/>
+          <a:chExt cx="0" cy="0"/>
+        </a:xfrm>
+      </p:grpSpPr>
+      <p:sp>
+        <p:nvSpPr>
+          <p:cNvPr id="2" name="Title 1">
+            <a:extLst>
+              <a:ext uri="{FF2B5EF4-FFF2-40B4-BE49-F238E27FC236}">
+                <a16:creationId xmlns:a16="http://schemas.microsoft.com/office/drawing/2014/main" id="{426BD9DA-40C7-C2A6-C60C-90341087CF31}"/>
+              </a:ext>
+            </a:extLst>
+          </p:cNvPr>
+          <p:cNvSpPr>
+            <a:spLocks noGrp="1"/>
+          </p:cNvSpPr>
+          <p:nvPr>
+            <p:ph type="title"/>
+          </p:nvPr>
+        </p:nvSpPr>
+        <p:spPr/>
+        <p:txBody>
+          <a:bodyPr/>
+          <a:lstStyle/>
+          <a:p>
+            <a:r>
+              <a:rPr lang="en-US" dirty="0"/>
+              <a:t>Let’s Workshop a Few</a:t>
+            </a:r>
+          </a:p>
+        </p:txBody>
+      </p:sp>
+      <p:graphicFrame>
+        <p:nvGraphicFramePr>
+          <p:cNvPr id="4" name="Content Placeholder 3">
+            <a:extLst>
+              <a:ext uri="{FF2B5EF4-FFF2-40B4-BE49-F238E27FC236}">
+                <a16:creationId xmlns:a16="http://schemas.microsoft.com/office/drawing/2014/main" id="{880D736B-8CF0-CA1C-BA6C-6B15D636B54E}"/>
+              </a:ext>
+            </a:extLst>
+          </p:cNvPr>
+          <p:cNvGraphicFramePr>
+            <a:graphicFrameLocks noGrp="1"/>
+          </p:cNvGraphicFramePr>
+          <p:nvPr>
+            <p:ph idx="1"/>
+            <p:extLst>
+              <p:ext uri="{D42A27DB-BD31-4B8C-83A1-F6EECF244321}">
+                <p14:modId xmlns:p14="http://schemas.microsoft.com/office/powerpoint/2010/main" val="1115372214"/>
+              </p:ext>
+            </p:extLst>
+          </p:nvPr>
+        </p:nvGraphicFramePr>
+        <p:xfrm>
+          <a:off x="581192" y="2180496"/>
+          <a:ext cx="11029615" cy="3678303"/>
+        </p:xfrm>
+        <a:graphic>
+          <a:graphicData uri="http://schemas.openxmlformats.org/drawingml/2006/diagram">
+            <dgm:relIds xmlns:dgm="http://schemas.openxmlformats.org/drawingml/2006/diagram" xmlns:r="http://schemas.openxmlformats.org/officeDocument/2006/relationships" r:dm="rId2" r:lo="rId3" r:qs="rId4" r:cs="rId5"/>
+          </a:graphicData>
+        </a:graphic>
+      </p:graphicFrame>
+    </p:spTree>
+    <p:extLst>
+      <p:ext uri="{BB962C8B-B14F-4D97-AF65-F5344CB8AC3E}">
+        <p14:creationId xmlns:p14="http://schemas.microsoft.com/office/powerpoint/2010/main" val="262762887"/>
+      </p:ext>
+    </p:extLst>
+  </p:cSld>
+  <p:clrMapOvr>
+    <a:masterClrMapping/>
+  </p:clrMapOvr>
+</p:sld>
+</file>
+
+<file path=ppt/slides/slide26.xml><?xml version="1.0" encoding="utf-8"?>
+<p:sld xmlns:a="http://schemas.openxmlformats.org/drawingml/2006/main" xmlns:r="http://schemas.openxmlformats.org/officeDocument/2006/relationships" xmlns:p="http://schemas.openxmlformats.org/presentationml/2006/main">
+  <p:cSld>
+    <p:spTree>
+      <p:nvGrpSpPr>
+        <p:cNvPr id="1" name=""/>
+        <p:cNvGrpSpPr/>
+        <p:nvPr/>
+      </p:nvGrpSpPr>
+      <p:grpSpPr>
+        <a:xfrm>
+          <a:off x="0" y="0"/>
+          <a:ext cx="0" cy="0"/>
+          <a:chOff x="0" y="0"/>
+          <a:chExt cx="0" cy="0"/>
+        </a:xfrm>
+      </p:grpSpPr>
+      <p:sp>
+        <p:nvSpPr>
+          <p:cNvPr id="2" name="Title 1">
+            <a:extLst>
+              <a:ext uri="{FF2B5EF4-FFF2-40B4-BE49-F238E27FC236}">
+                <a16:creationId xmlns:a16="http://schemas.microsoft.com/office/drawing/2014/main" id="{581E5997-6201-9F47-5CFE-66990831FDFD}"/>
+              </a:ext>
+            </a:extLst>
+          </p:cNvPr>
+          <p:cNvSpPr>
+            <a:spLocks noGrp="1"/>
+          </p:cNvSpPr>
+          <p:nvPr>
+            <p:ph type="title"/>
+          </p:nvPr>
+        </p:nvSpPr>
+        <p:spPr/>
+        <p:txBody>
+          <a:bodyPr/>
+          <a:lstStyle/>
+          <a:p>
+            <a:r>
+              <a:rPr lang="en-US" dirty="0"/>
+              <a:t>Answerable with A Simulation</a:t>
+            </a:r>
+          </a:p>
+        </p:txBody>
+      </p:sp>
+      <p:sp>
+        <p:nvSpPr>
+          <p:cNvPr id="3" name="Content Placeholder 2">
+            <a:extLst>
+              <a:ext uri="{FF2B5EF4-FFF2-40B4-BE49-F238E27FC236}">
+                <a16:creationId xmlns:a16="http://schemas.microsoft.com/office/drawing/2014/main" id="{1B8FB013-9CBC-0563-9BDA-7E03738C6CBD}"/>
+              </a:ext>
+            </a:extLst>
+          </p:cNvPr>
+          <p:cNvSpPr>
+            <a:spLocks noGrp="1"/>
+          </p:cNvSpPr>
+          <p:nvPr>
+            <p:ph idx="1"/>
+          </p:nvPr>
+        </p:nvSpPr>
+        <p:spPr/>
+        <p:txBody>
+          <a:bodyPr/>
+          <a:lstStyle/>
+          <a:p>
+            <a:r>
+              <a:rPr lang="en-US" dirty="0"/>
+              <a:t>How / Process Questions </a:t>
+            </a:r>
+          </a:p>
+          <a:p>
+            <a:r>
+              <a:rPr lang="en-US" dirty="0"/>
+              <a:t>Abductive Research:</a:t>
+            </a:r>
+          </a:p>
+          <a:p>
+            <a:pPr lvl="1"/>
+            <a:r>
+              <a:rPr lang="en-US" dirty="0"/>
+              <a:t>the research process starts with 'surprising facts' or 'puzzles' and the research process is devoted their explanation</a:t>
+            </a:r>
+          </a:p>
+          <a:p>
+            <a:r>
+              <a:rPr lang="en-US" dirty="0"/>
+              <a:t>Model-building questions:</a:t>
+            </a:r>
+          </a:p>
+          <a:p>
+            <a:pPr lvl="1"/>
+            <a:r>
+              <a:rPr lang="en-US" dirty="0"/>
+              <a:t>What happens if we take expected scenarios and change one thing -- ‘play out’ the consequences </a:t>
+            </a:r>
+          </a:p>
+        </p:txBody>
+      </p:sp>
+    </p:spTree>
+    <p:extLst>
+      <p:ext uri="{BB962C8B-B14F-4D97-AF65-F5344CB8AC3E}">
+        <p14:creationId xmlns:p14="http://schemas.microsoft.com/office/powerpoint/2010/main" val="3831328478"/>
+      </p:ext>
+    </p:extLst>
+  </p:cSld>
+  <p:clrMapOvr>
+    <a:masterClrMapping/>
+  </p:clrMapOvr>
+</p:sld>
+</file>
+
+<file path=ppt/slides/slide27.xml><?xml version="1.0" encoding="utf-8"?>
+<p:sld xmlns:a="http://schemas.openxmlformats.org/drawingml/2006/main" xmlns:r="http://schemas.openxmlformats.org/officeDocument/2006/relationships" xmlns:p="http://schemas.openxmlformats.org/presentationml/2006/main">
+  <p:cSld>
+    <p:spTree>
+      <p:nvGrpSpPr>
+        <p:cNvPr id="1" name=""/>
+        <p:cNvGrpSpPr/>
+        <p:nvPr/>
+      </p:nvGrpSpPr>
+      <p:grpSpPr>
+        <a:xfrm>
+          <a:off x="0" y="0"/>
+          <a:ext cx="0" cy="0"/>
+          <a:chOff x="0" y="0"/>
+          <a:chExt cx="0" cy="0"/>
+        </a:xfrm>
+      </p:grpSpPr>
+      <p:sp>
+        <p:nvSpPr>
+          <p:cNvPr id="2" name="Title 1">
+            <a:extLst>
+              <a:ext uri="{FF2B5EF4-FFF2-40B4-BE49-F238E27FC236}">
+                <a16:creationId xmlns:a16="http://schemas.microsoft.com/office/drawing/2014/main" id="{DB7A095A-0556-E1C4-1589-873534B9B01B}"/>
+              </a:ext>
+            </a:extLst>
+          </p:cNvPr>
+          <p:cNvSpPr>
+            <a:spLocks noGrp="1"/>
+          </p:cNvSpPr>
+          <p:nvPr>
+            <p:ph type="title"/>
+          </p:nvPr>
+        </p:nvSpPr>
+        <p:spPr/>
+        <p:txBody>
+          <a:bodyPr/>
+          <a:lstStyle/>
+          <a:p>
+            <a:r>
+              <a:rPr lang="en-US" dirty="0"/>
+              <a:t>Ways of Brainstorming Questions (Booth et al)</a:t>
+            </a:r>
+          </a:p>
+        </p:txBody>
+      </p:sp>
+      <p:sp>
+        <p:nvSpPr>
+          <p:cNvPr id="3" name="Content Placeholder 2">
+            <a:extLst>
+              <a:ext uri="{FF2B5EF4-FFF2-40B4-BE49-F238E27FC236}">
+                <a16:creationId xmlns:a16="http://schemas.microsoft.com/office/drawing/2014/main" id="{A11B3E00-AB4D-118F-A736-C8C9D3045873}"/>
+              </a:ext>
+            </a:extLst>
+          </p:cNvPr>
+          <p:cNvSpPr>
+            <a:spLocks noGrp="1"/>
+          </p:cNvSpPr>
+          <p:nvPr>
+            <p:ph idx="1"/>
+          </p:nvPr>
+        </p:nvSpPr>
+        <p:spPr>
+          <a:xfrm>
+            <a:off x="581192" y="2180496"/>
+            <a:ext cx="11029615" cy="4529062"/>
+          </a:xfrm>
+        </p:spPr>
+        <p:txBody>
+          <a:bodyPr>
+            <a:normAutofit/>
+          </a:bodyPr>
+          <a:lstStyle/>
+          <a:p>
+            <a:r>
+              <a:rPr lang="en-US" b="1" dirty="0"/>
+              <a:t>Think about the history of your topic</a:t>
+            </a:r>
+          </a:p>
+          <a:p>
+            <a:pPr lvl="1"/>
+            <a:r>
+              <a:rPr lang="en-US" dirty="0"/>
+              <a:t>How does it fit into a larger socio-historical context? </a:t>
+            </a:r>
+          </a:p>
+          <a:p>
+            <a:pPr lvl="1"/>
+            <a:r>
+              <a:rPr lang="en-US" dirty="0"/>
+              <a:t>What is the history of the topic? How was the topic changed over time? </a:t>
+            </a:r>
+          </a:p>
+          <a:p>
+            <a:r>
+              <a:rPr lang="en-US" dirty="0"/>
+              <a:t>Ask about the structure or composition of your topic</a:t>
+            </a:r>
+          </a:p>
+          <a:p>
+            <a:r>
+              <a:rPr lang="en-US" dirty="0"/>
+              <a:t>Ask how the topic is categorized</a:t>
+            </a:r>
+          </a:p>
+          <a:p>
+            <a:r>
+              <a:rPr lang="en-US" dirty="0"/>
+              <a:t>Turn positive questions into negative ones </a:t>
+            </a:r>
+          </a:p>
+          <a:p>
+            <a:r>
+              <a:rPr lang="en-US" dirty="0"/>
+              <a:t>Ask “What if” and other speculative questions</a:t>
+            </a:r>
+          </a:p>
+          <a:p>
+            <a:r>
+              <a:rPr lang="en-US" dirty="0"/>
+              <a:t>Ask questions that are suggested by your sources</a:t>
+            </a:r>
+          </a:p>
+        </p:txBody>
+      </p:sp>
+    </p:spTree>
+    <p:extLst>
+      <p:ext uri="{BB962C8B-B14F-4D97-AF65-F5344CB8AC3E}">
+        <p14:creationId xmlns:p14="http://schemas.microsoft.com/office/powerpoint/2010/main" val="1146627572"/>
+      </p:ext>
+    </p:extLst>
+  </p:cSld>
+  <p:clrMapOvr>
+    <a:masterClrMapping/>
+  </p:clrMapOvr>
+</p:sld>
+</file>
+
+<file path=ppt/slides/slide28.xml><?xml version="1.0" encoding="utf-8"?>
+<p:sld xmlns:a="http://schemas.openxmlformats.org/drawingml/2006/main" xmlns:r="http://schemas.openxmlformats.org/officeDocument/2006/relationships" xmlns:p="http://schemas.openxmlformats.org/presentationml/2006/main">
+  <p:cSld>
+    <p:spTree>
+      <p:nvGrpSpPr>
+        <p:cNvPr id="1" name=""/>
+        <p:cNvGrpSpPr/>
+        <p:nvPr/>
+      </p:nvGrpSpPr>
+      <p:grpSpPr>
+        <a:xfrm>
+          <a:off x="0" y="0"/>
+          <a:ext cx="0" cy="0"/>
+          <a:chOff x="0" y="0"/>
+          <a:chExt cx="0" cy="0"/>
+        </a:xfrm>
+      </p:grpSpPr>
+      <p:sp>
+        <p:nvSpPr>
+          <p:cNvPr id="2" name="Title 1">
+            <a:extLst>
+              <a:ext uri="{FF2B5EF4-FFF2-40B4-BE49-F238E27FC236}">
+                <a16:creationId xmlns:a16="http://schemas.microsoft.com/office/drawing/2014/main" id="{DB7A095A-0556-E1C4-1589-873534B9B01B}"/>
+              </a:ext>
+            </a:extLst>
+          </p:cNvPr>
+          <p:cNvSpPr>
+            <a:spLocks noGrp="1"/>
+          </p:cNvSpPr>
+          <p:nvPr>
+            <p:ph type="title"/>
+          </p:nvPr>
+        </p:nvSpPr>
+        <p:spPr/>
+        <p:txBody>
+          <a:bodyPr/>
+          <a:lstStyle/>
+          <a:p>
+            <a:r>
+              <a:rPr lang="en-US" dirty="0"/>
+              <a:t>Ways of Brainstorming Questions (Booth et al)</a:t>
+            </a:r>
+          </a:p>
+        </p:txBody>
+      </p:sp>
+      <p:sp>
+        <p:nvSpPr>
+          <p:cNvPr id="3" name="Content Placeholder 2">
+            <a:extLst>
+              <a:ext uri="{FF2B5EF4-FFF2-40B4-BE49-F238E27FC236}">
+                <a16:creationId xmlns:a16="http://schemas.microsoft.com/office/drawing/2014/main" id="{A11B3E00-AB4D-118F-A736-C8C9D3045873}"/>
+              </a:ext>
+            </a:extLst>
+          </p:cNvPr>
+          <p:cNvSpPr>
+            <a:spLocks noGrp="1"/>
+          </p:cNvSpPr>
+          <p:nvPr>
+            <p:ph idx="1"/>
+          </p:nvPr>
+        </p:nvSpPr>
+        <p:spPr>
+          <a:xfrm>
+            <a:off x="581192" y="2180496"/>
+            <a:ext cx="11029615" cy="4529062"/>
+          </a:xfrm>
+        </p:spPr>
+        <p:txBody>
+          <a:bodyPr>
+            <a:normAutofit/>
+          </a:bodyPr>
+          <a:lstStyle/>
+          <a:p>
+            <a:r>
+              <a:rPr lang="en-US" dirty="0"/>
+              <a:t>Think about the history of your topic</a:t>
+            </a:r>
+          </a:p>
+          <a:p>
+            <a:r>
+              <a:rPr lang="en-US" b="1" dirty="0"/>
+              <a:t>Ask about the structure or composition of your topic</a:t>
+            </a:r>
+          </a:p>
+          <a:p>
+            <a:pPr lvl="1"/>
+            <a:r>
+              <a:rPr lang="en-US" dirty="0"/>
+              <a:t>How do the parts of your topic fit together as a system? </a:t>
+            </a:r>
+          </a:p>
+          <a:p>
+            <a:pPr lvl="1"/>
+            <a:r>
+              <a:rPr lang="en-US" dirty="0"/>
+              <a:t>How does your topic function as part of society as a whole? </a:t>
+            </a:r>
+          </a:p>
+          <a:p>
+            <a:r>
+              <a:rPr lang="en-US" dirty="0"/>
+              <a:t>Ask how the topic is categorized</a:t>
+            </a:r>
+          </a:p>
+          <a:p>
+            <a:r>
+              <a:rPr lang="en-US" dirty="0"/>
+              <a:t>Turn positive questions into negative ones </a:t>
+            </a:r>
+          </a:p>
+          <a:p>
+            <a:r>
+              <a:rPr lang="en-US" dirty="0"/>
+              <a:t>Ask “What if” and other speculative questions</a:t>
+            </a:r>
+          </a:p>
+          <a:p>
+            <a:r>
+              <a:rPr lang="en-US" dirty="0"/>
+              <a:t>Ask questions that are suggested by your sources</a:t>
+            </a:r>
+          </a:p>
+          <a:p>
+            <a:pPr lvl="1"/>
+            <a:endParaRPr lang="en-US" dirty="0"/>
+          </a:p>
+        </p:txBody>
+      </p:sp>
+    </p:spTree>
+    <p:extLst>
+      <p:ext uri="{BB962C8B-B14F-4D97-AF65-F5344CB8AC3E}">
+        <p14:creationId xmlns:p14="http://schemas.microsoft.com/office/powerpoint/2010/main" val="2978190868"/>
+      </p:ext>
+    </p:extLst>
+  </p:cSld>
+  <p:clrMapOvr>
+    <a:masterClrMapping/>
+  </p:clrMapOvr>
+</p:sld>
+</file>
+
+<file path=ppt/slides/slide29.xml><?xml version="1.0" encoding="utf-8"?>
+<p:sld xmlns:a="http://schemas.openxmlformats.org/drawingml/2006/main" xmlns:r="http://schemas.openxmlformats.org/officeDocument/2006/relationships" xmlns:p="http://schemas.openxmlformats.org/presentationml/2006/main">
+  <p:cSld>
+    <p:spTree>
+      <p:nvGrpSpPr>
+        <p:cNvPr id="1" name=""/>
+        <p:cNvGrpSpPr/>
+        <p:nvPr/>
+      </p:nvGrpSpPr>
+      <p:grpSpPr>
+        <a:xfrm>
+          <a:off x="0" y="0"/>
+          <a:ext cx="0" cy="0"/>
+          <a:chOff x="0" y="0"/>
+          <a:chExt cx="0" cy="0"/>
+        </a:xfrm>
+      </p:grpSpPr>
+      <p:sp>
+        <p:nvSpPr>
+          <p:cNvPr id="2" name="Title 1">
+            <a:extLst>
+              <a:ext uri="{FF2B5EF4-FFF2-40B4-BE49-F238E27FC236}">
+                <a16:creationId xmlns:a16="http://schemas.microsoft.com/office/drawing/2014/main" id="{DB7A095A-0556-E1C4-1589-873534B9B01B}"/>
+              </a:ext>
+            </a:extLst>
+          </p:cNvPr>
+          <p:cNvSpPr>
+            <a:spLocks noGrp="1"/>
+          </p:cNvSpPr>
+          <p:nvPr>
+            <p:ph type="title"/>
+          </p:nvPr>
+        </p:nvSpPr>
+        <p:spPr/>
+        <p:txBody>
+          <a:bodyPr/>
+          <a:lstStyle/>
+          <a:p>
+            <a:r>
+              <a:rPr lang="en-US" dirty="0"/>
+              <a:t>Ways of Brainstorming Questions (Booth et al)</a:t>
+            </a:r>
+          </a:p>
+        </p:txBody>
+      </p:sp>
+      <p:sp>
+        <p:nvSpPr>
+          <p:cNvPr id="3" name="Content Placeholder 2">
+            <a:extLst>
+              <a:ext uri="{FF2B5EF4-FFF2-40B4-BE49-F238E27FC236}">
+                <a16:creationId xmlns:a16="http://schemas.microsoft.com/office/drawing/2014/main" id="{A11B3E00-AB4D-118F-A736-C8C9D3045873}"/>
+              </a:ext>
+            </a:extLst>
+          </p:cNvPr>
+          <p:cNvSpPr>
+            <a:spLocks noGrp="1"/>
+          </p:cNvSpPr>
+          <p:nvPr>
+            <p:ph idx="1"/>
+          </p:nvPr>
+        </p:nvSpPr>
+        <p:spPr>
+          <a:xfrm>
+            <a:off x="581192" y="2180496"/>
+            <a:ext cx="11029615" cy="4529062"/>
+          </a:xfrm>
+        </p:spPr>
+        <p:txBody>
+          <a:bodyPr>
+            <a:normAutofit/>
+          </a:bodyPr>
+          <a:lstStyle/>
+          <a:p>
+            <a:r>
+              <a:rPr lang="en-US" dirty="0"/>
+              <a:t>Think about the history of your topic</a:t>
+            </a:r>
+          </a:p>
+          <a:p>
+            <a:r>
+              <a:rPr lang="en-US" dirty="0"/>
+              <a:t>Ask about the structure or composition of your topic</a:t>
+            </a:r>
+          </a:p>
+          <a:p>
+            <a:r>
+              <a:rPr lang="en-US" b="1" dirty="0"/>
+              <a:t>Ask how the topic is categorized</a:t>
+            </a:r>
+          </a:p>
+          <a:p>
+            <a:pPr lvl="1"/>
+            <a:r>
+              <a:rPr lang="en-US" dirty="0"/>
+              <a:t>How can your topic be grouped into kinds? </a:t>
+            </a:r>
+          </a:p>
+          <a:p>
+            <a:pPr lvl="1"/>
+            <a:r>
+              <a:rPr lang="en-US" dirty="0"/>
+              <a:t>How does your topic compare/contrast with others like it? </a:t>
+            </a:r>
+          </a:p>
+          <a:p>
+            <a:r>
+              <a:rPr lang="en-US" dirty="0"/>
+              <a:t>Turn positive questions into negative ones </a:t>
+            </a:r>
+          </a:p>
+          <a:p>
+            <a:r>
+              <a:rPr lang="en-US" dirty="0"/>
+              <a:t>Ask “What if” and other speculative questions</a:t>
+            </a:r>
+          </a:p>
+          <a:p>
+            <a:r>
+              <a:rPr lang="en-US" dirty="0"/>
+              <a:t>Ask questions that are suggested by your sources</a:t>
+            </a:r>
+          </a:p>
+        </p:txBody>
+      </p:sp>
+    </p:spTree>
+    <p:extLst>
+      <p:ext uri="{BB962C8B-B14F-4D97-AF65-F5344CB8AC3E}">
+        <p14:creationId xmlns:p14="http://schemas.microsoft.com/office/powerpoint/2010/main" val="392062920"/>
+      </p:ext>
+    </p:extLst>
+  </p:cSld>
+  <p:clrMapOvr>
+    <a:masterClrMapping/>
+  </p:clrMapOvr>
+</p:sld>
+</file>
+
+<file path=ppt/slides/slide3.xml><?xml version="1.0" encoding="utf-8"?>
 <p:sld xmlns:a="http://schemas.openxmlformats.org/drawingml/2006/main" xmlns:r="http://schemas.openxmlformats.org/officeDocument/2006/relationships" xmlns:p="http://schemas.openxmlformats.org/presentationml/2006/main">
   <p:cSld>
     <p:spTree>
@@ -38779,998 +40432,7 @@
 </p:sld>
 </file>
 
-<file path=ppt/slides/slide20.xml><?xml version="1.0" encoding="utf-8"?>
-<p:sld xmlns:a="http://schemas.openxmlformats.org/drawingml/2006/main" xmlns:r="http://schemas.openxmlformats.org/officeDocument/2006/relationships" xmlns:p="http://schemas.openxmlformats.org/presentationml/2006/main">
-  <p:cSld>
-    <p:bg>
-      <p:bgPr>
-        <a:solidFill>
-          <a:schemeClr val="bg1"/>
-        </a:solidFill>
-        <a:effectLst/>
-      </p:bgPr>
-    </p:bg>
-    <p:spTree>
-      <p:nvGrpSpPr>
-        <p:cNvPr id="1" name=""/>
-        <p:cNvGrpSpPr/>
-        <p:nvPr/>
-      </p:nvGrpSpPr>
-      <p:grpSpPr>
-        <a:xfrm>
-          <a:off x="0" y="0"/>
-          <a:ext cx="0" cy="0"/>
-          <a:chOff x="0" y="0"/>
-          <a:chExt cx="0" cy="0"/>
-        </a:xfrm>
-      </p:grpSpPr>
-      <p:sp>
-        <p:nvSpPr>
-          <p:cNvPr id="2" name="Title 1">
-            <a:extLst>
-              <a:ext uri="{FF2B5EF4-FFF2-40B4-BE49-F238E27FC236}">
-                <a16:creationId xmlns:a16="http://schemas.microsoft.com/office/drawing/2014/main" id="{9F9B55E7-E579-439B-166C-17A7423B42D9}"/>
-              </a:ext>
-            </a:extLst>
-          </p:cNvPr>
-          <p:cNvSpPr>
-            <a:spLocks noGrp="1"/>
-          </p:cNvSpPr>
-          <p:nvPr>
-            <p:ph type="title"/>
-          </p:nvPr>
-        </p:nvSpPr>
-        <p:spPr>
-          <a:xfrm>
-            <a:off x="581192" y="702156"/>
-            <a:ext cx="11029616" cy="1013800"/>
-          </a:xfrm>
-        </p:spPr>
-        <p:txBody>
-          <a:bodyPr>
-            <a:normAutofit/>
-          </a:bodyPr>
-          <a:lstStyle/>
-          <a:p>
-            <a:r>
-              <a:rPr lang="en-US">
-                <a:solidFill>
-                  <a:srgbClr val="FFFEFF"/>
-                </a:solidFill>
-              </a:rPr>
-              <a:t>Research Question form</a:t>
-            </a:r>
-          </a:p>
-        </p:txBody>
-      </p:sp>
-      <p:graphicFrame>
-        <p:nvGraphicFramePr>
-          <p:cNvPr id="6" name="Content Placeholder 2">
-            <a:extLst>
-              <a:ext uri="{FF2B5EF4-FFF2-40B4-BE49-F238E27FC236}">
-                <a16:creationId xmlns:a16="http://schemas.microsoft.com/office/drawing/2014/main" id="{805F57EF-0D00-3607-CA44-AFCBDE4E5AED}"/>
-              </a:ext>
-            </a:extLst>
-          </p:cNvPr>
-          <p:cNvGraphicFramePr>
-            <a:graphicFrameLocks noGrp="1"/>
-          </p:cNvGraphicFramePr>
-          <p:nvPr>
-            <p:ph idx="1"/>
-            <p:extLst>
-              <p:ext uri="{D42A27DB-BD31-4B8C-83A1-F6EECF244321}">
-                <p14:modId xmlns:p14="http://schemas.microsoft.com/office/powerpoint/2010/main" val="3360743163"/>
-              </p:ext>
-            </p:extLst>
-          </p:nvPr>
-        </p:nvGraphicFramePr>
-        <p:xfrm>
-          <a:off x="581025" y="2181225"/>
-          <a:ext cx="11029950" cy="3678238"/>
-        </p:xfrm>
-        <a:graphic>
-          <a:graphicData uri="http://schemas.openxmlformats.org/drawingml/2006/diagram">
-            <dgm:relIds xmlns:dgm="http://schemas.openxmlformats.org/drawingml/2006/diagram" xmlns:r="http://schemas.openxmlformats.org/officeDocument/2006/relationships" r:dm="rId2" r:lo="rId3" r:qs="rId4" r:cs="rId5"/>
-          </a:graphicData>
-        </a:graphic>
-      </p:graphicFrame>
-    </p:spTree>
-    <p:extLst>
-      <p:ext uri="{BB962C8B-B14F-4D97-AF65-F5344CB8AC3E}">
-        <p14:creationId xmlns:p14="http://schemas.microsoft.com/office/powerpoint/2010/main" val="1938461915"/>
-      </p:ext>
-    </p:extLst>
-  </p:cSld>
-  <p:clrMapOvr>
-    <a:masterClrMapping/>
-  </p:clrMapOvr>
-</p:sld>
-</file>
-
-<file path=ppt/slides/slide21.xml><?xml version="1.0" encoding="utf-8"?>
-<p:sld xmlns:a="http://schemas.openxmlformats.org/drawingml/2006/main" xmlns:r="http://schemas.openxmlformats.org/officeDocument/2006/relationships" xmlns:p="http://schemas.openxmlformats.org/presentationml/2006/main">
-  <p:cSld>
-    <p:spTree>
-      <p:nvGrpSpPr>
-        <p:cNvPr id="1" name=""/>
-        <p:cNvGrpSpPr/>
-        <p:nvPr/>
-      </p:nvGrpSpPr>
-      <p:grpSpPr>
-        <a:xfrm>
-          <a:off x="0" y="0"/>
-          <a:ext cx="0" cy="0"/>
-          <a:chOff x="0" y="0"/>
-          <a:chExt cx="0" cy="0"/>
-        </a:xfrm>
-      </p:grpSpPr>
-      <p:sp>
-        <p:nvSpPr>
-          <p:cNvPr id="2" name="Title 1">
-            <a:extLst>
-              <a:ext uri="{FF2B5EF4-FFF2-40B4-BE49-F238E27FC236}">
-                <a16:creationId xmlns:a16="http://schemas.microsoft.com/office/drawing/2014/main" id="{426BD9DA-40C7-C2A6-C60C-90341087CF31}"/>
-              </a:ext>
-            </a:extLst>
-          </p:cNvPr>
-          <p:cNvSpPr>
-            <a:spLocks noGrp="1"/>
-          </p:cNvSpPr>
-          <p:nvPr>
-            <p:ph type="title"/>
-          </p:nvPr>
-        </p:nvSpPr>
-        <p:spPr/>
-        <p:txBody>
-          <a:bodyPr/>
-          <a:lstStyle/>
-          <a:p>
-            <a:r>
-              <a:rPr lang="en-US" dirty="0"/>
-              <a:t>Example From Boyle &amp; McKinzie</a:t>
-            </a:r>
-          </a:p>
-        </p:txBody>
-      </p:sp>
-      <p:graphicFrame>
-        <p:nvGraphicFramePr>
-          <p:cNvPr id="4" name="Content Placeholder 3">
-            <a:extLst>
-              <a:ext uri="{FF2B5EF4-FFF2-40B4-BE49-F238E27FC236}">
-                <a16:creationId xmlns:a16="http://schemas.microsoft.com/office/drawing/2014/main" id="{880D736B-8CF0-CA1C-BA6C-6B15D636B54E}"/>
-              </a:ext>
-            </a:extLst>
-          </p:cNvPr>
-          <p:cNvGraphicFramePr>
-            <a:graphicFrameLocks noGrp="1"/>
-          </p:cNvGraphicFramePr>
-          <p:nvPr>
-            <p:ph idx="1"/>
-            <p:extLst>
-              <p:ext uri="{D42A27DB-BD31-4B8C-83A1-F6EECF244321}">
-                <p14:modId xmlns:p14="http://schemas.microsoft.com/office/powerpoint/2010/main" val="3967671196"/>
-              </p:ext>
-            </p:extLst>
-          </p:nvPr>
-        </p:nvGraphicFramePr>
-        <p:xfrm>
-          <a:off x="581192" y="2180496"/>
-          <a:ext cx="11029615" cy="3678303"/>
-        </p:xfrm>
-        <a:graphic>
-          <a:graphicData uri="http://schemas.openxmlformats.org/drawingml/2006/diagram">
-            <dgm:relIds xmlns:dgm="http://schemas.openxmlformats.org/drawingml/2006/diagram" xmlns:r="http://schemas.openxmlformats.org/officeDocument/2006/relationships" r:dm="rId2" r:lo="rId3" r:qs="rId4" r:cs="rId5"/>
-          </a:graphicData>
-        </a:graphic>
-      </p:graphicFrame>
-    </p:spTree>
-    <p:extLst>
-      <p:ext uri="{BB962C8B-B14F-4D97-AF65-F5344CB8AC3E}">
-        <p14:creationId xmlns:p14="http://schemas.microsoft.com/office/powerpoint/2010/main" val="1547504072"/>
-      </p:ext>
-    </p:extLst>
-  </p:cSld>
-  <p:clrMapOvr>
-    <a:masterClrMapping/>
-  </p:clrMapOvr>
-</p:sld>
-</file>
-
-<file path=ppt/slides/slide22.xml><?xml version="1.0" encoding="utf-8"?>
-<p:sld xmlns:a="http://schemas.openxmlformats.org/drawingml/2006/main" xmlns:r="http://schemas.openxmlformats.org/officeDocument/2006/relationships" xmlns:p="http://schemas.openxmlformats.org/presentationml/2006/main">
-  <p:cSld>
-    <p:spTree>
-      <p:nvGrpSpPr>
-        <p:cNvPr id="1" name=""/>
-        <p:cNvGrpSpPr/>
-        <p:nvPr/>
-      </p:nvGrpSpPr>
-      <p:grpSpPr>
-        <a:xfrm>
-          <a:off x="0" y="0"/>
-          <a:ext cx="0" cy="0"/>
-          <a:chOff x="0" y="0"/>
-          <a:chExt cx="0" cy="0"/>
-        </a:xfrm>
-      </p:grpSpPr>
-      <p:sp>
-        <p:nvSpPr>
-          <p:cNvPr id="2" name="Title 1">
-            <a:extLst>
-              <a:ext uri="{FF2B5EF4-FFF2-40B4-BE49-F238E27FC236}">
-                <a16:creationId xmlns:a16="http://schemas.microsoft.com/office/drawing/2014/main" id="{426BD9DA-40C7-C2A6-C60C-90341087CF31}"/>
-              </a:ext>
-            </a:extLst>
-          </p:cNvPr>
-          <p:cNvSpPr>
-            <a:spLocks noGrp="1"/>
-          </p:cNvSpPr>
-          <p:nvPr>
-            <p:ph type="title"/>
-          </p:nvPr>
-        </p:nvSpPr>
-        <p:spPr/>
-        <p:txBody>
-          <a:bodyPr/>
-          <a:lstStyle/>
-          <a:p>
-            <a:r>
-              <a:rPr lang="en-US" dirty="0"/>
-              <a:t>Example Question</a:t>
-            </a:r>
-          </a:p>
-        </p:txBody>
-      </p:sp>
-      <p:graphicFrame>
-        <p:nvGraphicFramePr>
-          <p:cNvPr id="4" name="Content Placeholder 3">
-            <a:extLst>
-              <a:ext uri="{FF2B5EF4-FFF2-40B4-BE49-F238E27FC236}">
-                <a16:creationId xmlns:a16="http://schemas.microsoft.com/office/drawing/2014/main" id="{880D736B-8CF0-CA1C-BA6C-6B15D636B54E}"/>
-              </a:ext>
-            </a:extLst>
-          </p:cNvPr>
-          <p:cNvGraphicFramePr>
-            <a:graphicFrameLocks noGrp="1"/>
-          </p:cNvGraphicFramePr>
-          <p:nvPr>
-            <p:ph idx="1"/>
-            <p:extLst>
-              <p:ext uri="{D42A27DB-BD31-4B8C-83A1-F6EECF244321}">
-                <p14:modId xmlns:p14="http://schemas.microsoft.com/office/powerpoint/2010/main" val="2188152511"/>
-              </p:ext>
-            </p:extLst>
-          </p:nvPr>
-        </p:nvGraphicFramePr>
-        <p:xfrm>
-          <a:off x="581192" y="2180496"/>
-          <a:ext cx="11029615" cy="3678303"/>
-        </p:xfrm>
-        <a:graphic>
-          <a:graphicData uri="http://schemas.openxmlformats.org/drawingml/2006/diagram">
-            <dgm:relIds xmlns:dgm="http://schemas.openxmlformats.org/drawingml/2006/diagram" xmlns:r="http://schemas.openxmlformats.org/officeDocument/2006/relationships" r:dm="rId2" r:lo="rId3" r:qs="rId4" r:cs="rId5"/>
-          </a:graphicData>
-        </a:graphic>
-      </p:graphicFrame>
-    </p:spTree>
-    <p:extLst>
-      <p:ext uri="{BB962C8B-B14F-4D97-AF65-F5344CB8AC3E}">
-        <p14:creationId xmlns:p14="http://schemas.microsoft.com/office/powerpoint/2010/main" val="606178700"/>
-      </p:ext>
-    </p:extLst>
-  </p:cSld>
-  <p:clrMapOvr>
-    <a:masterClrMapping/>
-  </p:clrMapOvr>
-</p:sld>
-</file>
-
-<file path=ppt/slides/slide23.xml><?xml version="1.0" encoding="utf-8"?>
-<p:sld xmlns:a="http://schemas.openxmlformats.org/drawingml/2006/main" xmlns:r="http://schemas.openxmlformats.org/officeDocument/2006/relationships" xmlns:p="http://schemas.openxmlformats.org/presentationml/2006/main">
-  <p:cSld>
-    <p:spTree>
-      <p:nvGrpSpPr>
-        <p:cNvPr id="1" name=""/>
-        <p:cNvGrpSpPr/>
-        <p:nvPr/>
-      </p:nvGrpSpPr>
-      <p:grpSpPr>
-        <a:xfrm>
-          <a:off x="0" y="0"/>
-          <a:ext cx="0" cy="0"/>
-          <a:chOff x="0" y="0"/>
-          <a:chExt cx="0" cy="0"/>
-        </a:xfrm>
-      </p:grpSpPr>
-      <p:sp>
-        <p:nvSpPr>
-          <p:cNvPr id="2" name="Title 1">
-            <a:extLst>
-              <a:ext uri="{FF2B5EF4-FFF2-40B4-BE49-F238E27FC236}">
-                <a16:creationId xmlns:a16="http://schemas.microsoft.com/office/drawing/2014/main" id="{426BD9DA-40C7-C2A6-C60C-90341087CF31}"/>
-              </a:ext>
-            </a:extLst>
-          </p:cNvPr>
-          <p:cNvSpPr>
-            <a:spLocks noGrp="1"/>
-          </p:cNvSpPr>
-          <p:nvPr>
-            <p:ph type="title"/>
-          </p:nvPr>
-        </p:nvSpPr>
-        <p:spPr/>
-        <p:txBody>
-          <a:bodyPr/>
-          <a:lstStyle/>
-          <a:p>
-            <a:r>
-              <a:rPr lang="en-US" dirty="0"/>
-              <a:t>How can We fix it?</a:t>
-            </a:r>
-          </a:p>
-        </p:txBody>
-      </p:sp>
-      <p:graphicFrame>
-        <p:nvGraphicFramePr>
-          <p:cNvPr id="4" name="Content Placeholder 3">
-            <a:extLst>
-              <a:ext uri="{FF2B5EF4-FFF2-40B4-BE49-F238E27FC236}">
-                <a16:creationId xmlns:a16="http://schemas.microsoft.com/office/drawing/2014/main" id="{880D736B-8CF0-CA1C-BA6C-6B15D636B54E}"/>
-              </a:ext>
-            </a:extLst>
-          </p:cNvPr>
-          <p:cNvGraphicFramePr>
-            <a:graphicFrameLocks noGrp="1"/>
-          </p:cNvGraphicFramePr>
-          <p:nvPr>
-            <p:ph idx="1"/>
-            <p:extLst>
-              <p:ext uri="{D42A27DB-BD31-4B8C-83A1-F6EECF244321}">
-                <p14:modId xmlns:p14="http://schemas.microsoft.com/office/powerpoint/2010/main" val="3853451629"/>
-              </p:ext>
-            </p:extLst>
-          </p:nvPr>
-        </p:nvGraphicFramePr>
-        <p:xfrm>
-          <a:off x="581192" y="2180496"/>
-          <a:ext cx="11029615" cy="3678303"/>
-        </p:xfrm>
-        <a:graphic>
-          <a:graphicData uri="http://schemas.openxmlformats.org/drawingml/2006/diagram">
-            <dgm:relIds xmlns:dgm="http://schemas.openxmlformats.org/drawingml/2006/diagram" xmlns:r="http://schemas.openxmlformats.org/officeDocument/2006/relationships" r:dm="rId2" r:lo="rId3" r:qs="rId4" r:cs="rId5"/>
-          </a:graphicData>
-        </a:graphic>
-      </p:graphicFrame>
-    </p:spTree>
-    <p:extLst>
-      <p:ext uri="{BB962C8B-B14F-4D97-AF65-F5344CB8AC3E}">
-        <p14:creationId xmlns:p14="http://schemas.microsoft.com/office/powerpoint/2010/main" val="2053671706"/>
-      </p:ext>
-    </p:extLst>
-  </p:cSld>
-  <p:clrMapOvr>
-    <a:masterClrMapping/>
-  </p:clrMapOvr>
-</p:sld>
-</file>
-
-<file path=ppt/slides/slide24.xml><?xml version="1.0" encoding="utf-8"?>
-<p:sld xmlns:a="http://schemas.openxmlformats.org/drawingml/2006/main" xmlns:r="http://schemas.openxmlformats.org/officeDocument/2006/relationships" xmlns:p="http://schemas.openxmlformats.org/presentationml/2006/main">
-  <p:cSld>
-    <p:spTree>
-      <p:nvGrpSpPr>
-        <p:cNvPr id="1" name=""/>
-        <p:cNvGrpSpPr/>
-        <p:nvPr/>
-      </p:nvGrpSpPr>
-      <p:grpSpPr>
-        <a:xfrm>
-          <a:off x="0" y="0"/>
-          <a:ext cx="0" cy="0"/>
-          <a:chOff x="0" y="0"/>
-          <a:chExt cx="0" cy="0"/>
-        </a:xfrm>
-      </p:grpSpPr>
-      <p:sp>
-        <p:nvSpPr>
-          <p:cNvPr id="2" name="Title 1">
-            <a:extLst>
-              <a:ext uri="{FF2B5EF4-FFF2-40B4-BE49-F238E27FC236}">
-                <a16:creationId xmlns:a16="http://schemas.microsoft.com/office/drawing/2014/main" id="{426BD9DA-40C7-C2A6-C60C-90341087CF31}"/>
-              </a:ext>
-            </a:extLst>
-          </p:cNvPr>
-          <p:cNvSpPr>
-            <a:spLocks noGrp="1"/>
-          </p:cNvSpPr>
-          <p:nvPr>
-            <p:ph type="title"/>
-          </p:nvPr>
-        </p:nvSpPr>
-        <p:spPr/>
-        <p:txBody>
-          <a:bodyPr/>
-          <a:lstStyle/>
-          <a:p>
-            <a:r>
-              <a:rPr lang="en-US" dirty="0"/>
-              <a:t>Let’s Workshop a Few</a:t>
-            </a:r>
-          </a:p>
-        </p:txBody>
-      </p:sp>
-      <p:graphicFrame>
-        <p:nvGraphicFramePr>
-          <p:cNvPr id="4" name="Content Placeholder 3">
-            <a:extLst>
-              <a:ext uri="{FF2B5EF4-FFF2-40B4-BE49-F238E27FC236}">
-                <a16:creationId xmlns:a16="http://schemas.microsoft.com/office/drawing/2014/main" id="{880D736B-8CF0-CA1C-BA6C-6B15D636B54E}"/>
-              </a:ext>
-            </a:extLst>
-          </p:cNvPr>
-          <p:cNvGraphicFramePr>
-            <a:graphicFrameLocks noGrp="1"/>
-          </p:cNvGraphicFramePr>
-          <p:nvPr>
-            <p:ph idx="1"/>
-            <p:extLst>
-              <p:ext uri="{D42A27DB-BD31-4B8C-83A1-F6EECF244321}">
-                <p14:modId xmlns:p14="http://schemas.microsoft.com/office/powerpoint/2010/main" val="1115372214"/>
-              </p:ext>
-            </p:extLst>
-          </p:nvPr>
-        </p:nvGraphicFramePr>
-        <p:xfrm>
-          <a:off x="581192" y="2180496"/>
-          <a:ext cx="11029615" cy="3678303"/>
-        </p:xfrm>
-        <a:graphic>
-          <a:graphicData uri="http://schemas.openxmlformats.org/drawingml/2006/diagram">
-            <dgm:relIds xmlns:dgm="http://schemas.openxmlformats.org/drawingml/2006/diagram" xmlns:r="http://schemas.openxmlformats.org/officeDocument/2006/relationships" r:dm="rId2" r:lo="rId3" r:qs="rId4" r:cs="rId5"/>
-          </a:graphicData>
-        </a:graphic>
-      </p:graphicFrame>
-    </p:spTree>
-    <p:extLst>
-      <p:ext uri="{BB962C8B-B14F-4D97-AF65-F5344CB8AC3E}">
-        <p14:creationId xmlns:p14="http://schemas.microsoft.com/office/powerpoint/2010/main" val="262762887"/>
-      </p:ext>
-    </p:extLst>
-  </p:cSld>
-  <p:clrMapOvr>
-    <a:masterClrMapping/>
-  </p:clrMapOvr>
-</p:sld>
-</file>
-
-<file path=ppt/slides/slide25.xml><?xml version="1.0" encoding="utf-8"?>
-<p:sld xmlns:a="http://schemas.openxmlformats.org/drawingml/2006/main" xmlns:r="http://schemas.openxmlformats.org/officeDocument/2006/relationships" xmlns:p="http://schemas.openxmlformats.org/presentationml/2006/main">
-  <p:cSld>
-    <p:spTree>
-      <p:nvGrpSpPr>
-        <p:cNvPr id="1" name=""/>
-        <p:cNvGrpSpPr/>
-        <p:nvPr/>
-      </p:nvGrpSpPr>
-      <p:grpSpPr>
-        <a:xfrm>
-          <a:off x="0" y="0"/>
-          <a:ext cx="0" cy="0"/>
-          <a:chOff x="0" y="0"/>
-          <a:chExt cx="0" cy="0"/>
-        </a:xfrm>
-      </p:grpSpPr>
-      <p:sp>
-        <p:nvSpPr>
-          <p:cNvPr id="2" name="Title 1">
-            <a:extLst>
-              <a:ext uri="{FF2B5EF4-FFF2-40B4-BE49-F238E27FC236}">
-                <a16:creationId xmlns:a16="http://schemas.microsoft.com/office/drawing/2014/main" id="{581E5997-6201-9F47-5CFE-66990831FDFD}"/>
-              </a:ext>
-            </a:extLst>
-          </p:cNvPr>
-          <p:cNvSpPr>
-            <a:spLocks noGrp="1"/>
-          </p:cNvSpPr>
-          <p:nvPr>
-            <p:ph type="title"/>
-          </p:nvPr>
-        </p:nvSpPr>
-        <p:spPr/>
-        <p:txBody>
-          <a:bodyPr/>
-          <a:lstStyle/>
-          <a:p>
-            <a:r>
-              <a:rPr lang="en-US" dirty="0"/>
-              <a:t>Answerable with A Simulation</a:t>
-            </a:r>
-          </a:p>
-        </p:txBody>
-      </p:sp>
-      <p:sp>
-        <p:nvSpPr>
-          <p:cNvPr id="3" name="Content Placeholder 2">
-            <a:extLst>
-              <a:ext uri="{FF2B5EF4-FFF2-40B4-BE49-F238E27FC236}">
-                <a16:creationId xmlns:a16="http://schemas.microsoft.com/office/drawing/2014/main" id="{1B8FB013-9CBC-0563-9BDA-7E03738C6CBD}"/>
-              </a:ext>
-            </a:extLst>
-          </p:cNvPr>
-          <p:cNvSpPr>
-            <a:spLocks noGrp="1"/>
-          </p:cNvSpPr>
-          <p:nvPr>
-            <p:ph idx="1"/>
-          </p:nvPr>
-        </p:nvSpPr>
-        <p:spPr/>
-        <p:txBody>
-          <a:bodyPr/>
-          <a:lstStyle/>
-          <a:p>
-            <a:r>
-              <a:rPr lang="en-US" dirty="0"/>
-              <a:t>How / Process Questions </a:t>
-            </a:r>
-          </a:p>
-          <a:p>
-            <a:r>
-              <a:rPr lang="en-US" dirty="0"/>
-              <a:t>Abductive Research:</a:t>
-            </a:r>
-          </a:p>
-          <a:p>
-            <a:pPr lvl="1"/>
-            <a:r>
-              <a:rPr lang="en-US" dirty="0"/>
-              <a:t>the research process starts with 'surprising facts' or 'puzzles' and the research process is devoted their explanation</a:t>
-            </a:r>
-          </a:p>
-          <a:p>
-            <a:r>
-              <a:rPr lang="en-US" dirty="0"/>
-              <a:t>Model-building questions:</a:t>
-            </a:r>
-          </a:p>
-          <a:p>
-            <a:pPr lvl="1"/>
-            <a:r>
-              <a:rPr lang="en-US" dirty="0"/>
-              <a:t>What happens if we take expected scenarios and change one thing -- ‘play out’ the consequences </a:t>
-            </a:r>
-          </a:p>
-        </p:txBody>
-      </p:sp>
-    </p:spTree>
-    <p:extLst>
-      <p:ext uri="{BB962C8B-B14F-4D97-AF65-F5344CB8AC3E}">
-        <p14:creationId xmlns:p14="http://schemas.microsoft.com/office/powerpoint/2010/main" val="3831328478"/>
-      </p:ext>
-    </p:extLst>
-  </p:cSld>
-  <p:clrMapOvr>
-    <a:masterClrMapping/>
-  </p:clrMapOvr>
-</p:sld>
-</file>
-
-<file path=ppt/slides/slide26.xml><?xml version="1.0" encoding="utf-8"?>
-<p:sld xmlns:a="http://schemas.openxmlformats.org/drawingml/2006/main" xmlns:r="http://schemas.openxmlformats.org/officeDocument/2006/relationships" xmlns:p="http://schemas.openxmlformats.org/presentationml/2006/main">
-  <p:cSld>
-    <p:spTree>
-      <p:nvGrpSpPr>
-        <p:cNvPr id="1" name=""/>
-        <p:cNvGrpSpPr/>
-        <p:nvPr/>
-      </p:nvGrpSpPr>
-      <p:grpSpPr>
-        <a:xfrm>
-          <a:off x="0" y="0"/>
-          <a:ext cx="0" cy="0"/>
-          <a:chOff x="0" y="0"/>
-          <a:chExt cx="0" cy="0"/>
-        </a:xfrm>
-      </p:grpSpPr>
-      <p:sp>
-        <p:nvSpPr>
-          <p:cNvPr id="2" name="Title 1">
-            <a:extLst>
-              <a:ext uri="{FF2B5EF4-FFF2-40B4-BE49-F238E27FC236}">
-                <a16:creationId xmlns:a16="http://schemas.microsoft.com/office/drawing/2014/main" id="{DB7A095A-0556-E1C4-1589-873534B9B01B}"/>
-              </a:ext>
-            </a:extLst>
-          </p:cNvPr>
-          <p:cNvSpPr>
-            <a:spLocks noGrp="1"/>
-          </p:cNvSpPr>
-          <p:nvPr>
-            <p:ph type="title"/>
-          </p:nvPr>
-        </p:nvSpPr>
-        <p:spPr/>
-        <p:txBody>
-          <a:bodyPr/>
-          <a:lstStyle/>
-          <a:p>
-            <a:r>
-              <a:rPr lang="en-US" dirty="0"/>
-              <a:t>Ways of Brainstorming Questions (Booth et al)</a:t>
-            </a:r>
-          </a:p>
-        </p:txBody>
-      </p:sp>
-      <p:sp>
-        <p:nvSpPr>
-          <p:cNvPr id="3" name="Content Placeholder 2">
-            <a:extLst>
-              <a:ext uri="{FF2B5EF4-FFF2-40B4-BE49-F238E27FC236}">
-                <a16:creationId xmlns:a16="http://schemas.microsoft.com/office/drawing/2014/main" id="{A11B3E00-AB4D-118F-A736-C8C9D3045873}"/>
-              </a:ext>
-            </a:extLst>
-          </p:cNvPr>
-          <p:cNvSpPr>
-            <a:spLocks noGrp="1"/>
-          </p:cNvSpPr>
-          <p:nvPr>
-            <p:ph idx="1"/>
-          </p:nvPr>
-        </p:nvSpPr>
-        <p:spPr>
-          <a:xfrm>
-            <a:off x="581192" y="2180496"/>
-            <a:ext cx="11029615" cy="4529062"/>
-          </a:xfrm>
-        </p:spPr>
-        <p:txBody>
-          <a:bodyPr>
-            <a:normAutofit/>
-          </a:bodyPr>
-          <a:lstStyle/>
-          <a:p>
-            <a:r>
-              <a:rPr lang="en-US" b="1" dirty="0"/>
-              <a:t>Think about the history of your topic</a:t>
-            </a:r>
-          </a:p>
-          <a:p>
-            <a:pPr lvl="1"/>
-            <a:r>
-              <a:rPr lang="en-US" dirty="0"/>
-              <a:t>How does it fit into a larger socio-historical context? </a:t>
-            </a:r>
-          </a:p>
-          <a:p>
-            <a:pPr lvl="1"/>
-            <a:r>
-              <a:rPr lang="en-US" dirty="0"/>
-              <a:t>What is the history of the topic? How was the topic changed over time? </a:t>
-            </a:r>
-          </a:p>
-          <a:p>
-            <a:r>
-              <a:rPr lang="en-US" dirty="0"/>
-              <a:t>Ask about the structure or composition of your topic</a:t>
-            </a:r>
-          </a:p>
-          <a:p>
-            <a:r>
-              <a:rPr lang="en-US" dirty="0"/>
-              <a:t>Ask how the topic is categorized</a:t>
-            </a:r>
-          </a:p>
-          <a:p>
-            <a:r>
-              <a:rPr lang="en-US" dirty="0"/>
-              <a:t>Turn positive questions into negative ones </a:t>
-            </a:r>
-          </a:p>
-          <a:p>
-            <a:r>
-              <a:rPr lang="en-US" dirty="0"/>
-              <a:t>Ask “What if” and other speculative questions</a:t>
-            </a:r>
-          </a:p>
-          <a:p>
-            <a:r>
-              <a:rPr lang="en-US" dirty="0"/>
-              <a:t>Ask questions that are suggested by your sources</a:t>
-            </a:r>
-          </a:p>
-        </p:txBody>
-      </p:sp>
-    </p:spTree>
-    <p:extLst>
-      <p:ext uri="{BB962C8B-B14F-4D97-AF65-F5344CB8AC3E}">
-        <p14:creationId xmlns:p14="http://schemas.microsoft.com/office/powerpoint/2010/main" val="1146627572"/>
-      </p:ext>
-    </p:extLst>
-  </p:cSld>
-  <p:clrMapOvr>
-    <a:masterClrMapping/>
-  </p:clrMapOvr>
-</p:sld>
-</file>
-
-<file path=ppt/slides/slide27.xml><?xml version="1.0" encoding="utf-8"?>
-<p:sld xmlns:a="http://schemas.openxmlformats.org/drawingml/2006/main" xmlns:r="http://schemas.openxmlformats.org/officeDocument/2006/relationships" xmlns:p="http://schemas.openxmlformats.org/presentationml/2006/main">
-  <p:cSld>
-    <p:spTree>
-      <p:nvGrpSpPr>
-        <p:cNvPr id="1" name=""/>
-        <p:cNvGrpSpPr/>
-        <p:nvPr/>
-      </p:nvGrpSpPr>
-      <p:grpSpPr>
-        <a:xfrm>
-          <a:off x="0" y="0"/>
-          <a:ext cx="0" cy="0"/>
-          <a:chOff x="0" y="0"/>
-          <a:chExt cx="0" cy="0"/>
-        </a:xfrm>
-      </p:grpSpPr>
-      <p:sp>
-        <p:nvSpPr>
-          <p:cNvPr id="2" name="Title 1">
-            <a:extLst>
-              <a:ext uri="{FF2B5EF4-FFF2-40B4-BE49-F238E27FC236}">
-                <a16:creationId xmlns:a16="http://schemas.microsoft.com/office/drawing/2014/main" id="{DB7A095A-0556-E1C4-1589-873534B9B01B}"/>
-              </a:ext>
-            </a:extLst>
-          </p:cNvPr>
-          <p:cNvSpPr>
-            <a:spLocks noGrp="1"/>
-          </p:cNvSpPr>
-          <p:nvPr>
-            <p:ph type="title"/>
-          </p:nvPr>
-        </p:nvSpPr>
-        <p:spPr/>
-        <p:txBody>
-          <a:bodyPr/>
-          <a:lstStyle/>
-          <a:p>
-            <a:r>
-              <a:rPr lang="en-US" dirty="0"/>
-              <a:t>Ways of Brainstorming Questions (Booth et al)</a:t>
-            </a:r>
-          </a:p>
-        </p:txBody>
-      </p:sp>
-      <p:sp>
-        <p:nvSpPr>
-          <p:cNvPr id="3" name="Content Placeholder 2">
-            <a:extLst>
-              <a:ext uri="{FF2B5EF4-FFF2-40B4-BE49-F238E27FC236}">
-                <a16:creationId xmlns:a16="http://schemas.microsoft.com/office/drawing/2014/main" id="{A11B3E00-AB4D-118F-A736-C8C9D3045873}"/>
-              </a:ext>
-            </a:extLst>
-          </p:cNvPr>
-          <p:cNvSpPr>
-            <a:spLocks noGrp="1"/>
-          </p:cNvSpPr>
-          <p:nvPr>
-            <p:ph idx="1"/>
-          </p:nvPr>
-        </p:nvSpPr>
-        <p:spPr>
-          <a:xfrm>
-            <a:off x="581192" y="2180496"/>
-            <a:ext cx="11029615" cy="4529062"/>
-          </a:xfrm>
-        </p:spPr>
-        <p:txBody>
-          <a:bodyPr>
-            <a:normAutofit/>
-          </a:bodyPr>
-          <a:lstStyle/>
-          <a:p>
-            <a:r>
-              <a:rPr lang="en-US" dirty="0"/>
-              <a:t>Think about the history of your topic</a:t>
-            </a:r>
-          </a:p>
-          <a:p>
-            <a:r>
-              <a:rPr lang="en-US" b="1" dirty="0"/>
-              <a:t>Ask about the structure or composition of your topic</a:t>
-            </a:r>
-          </a:p>
-          <a:p>
-            <a:pPr lvl="1"/>
-            <a:r>
-              <a:rPr lang="en-US" dirty="0"/>
-              <a:t>How do the parts of your topic fit together as a system? </a:t>
-            </a:r>
-          </a:p>
-          <a:p>
-            <a:pPr lvl="1"/>
-            <a:r>
-              <a:rPr lang="en-US" dirty="0"/>
-              <a:t>How does your topic function as part of society as a whole? </a:t>
-            </a:r>
-          </a:p>
-          <a:p>
-            <a:r>
-              <a:rPr lang="en-US" dirty="0"/>
-              <a:t>Ask how the topic is categorized</a:t>
-            </a:r>
-          </a:p>
-          <a:p>
-            <a:r>
-              <a:rPr lang="en-US" dirty="0"/>
-              <a:t>Turn positive questions into negative ones </a:t>
-            </a:r>
-          </a:p>
-          <a:p>
-            <a:r>
-              <a:rPr lang="en-US" dirty="0"/>
-              <a:t>Ask “What if” and other speculative questions</a:t>
-            </a:r>
-          </a:p>
-          <a:p>
-            <a:r>
-              <a:rPr lang="en-US" dirty="0"/>
-              <a:t>Ask questions that are suggested by your sources</a:t>
-            </a:r>
-          </a:p>
-          <a:p>
-            <a:pPr lvl="1"/>
-            <a:endParaRPr lang="en-US" dirty="0"/>
-          </a:p>
-        </p:txBody>
-      </p:sp>
-    </p:spTree>
-    <p:extLst>
-      <p:ext uri="{BB962C8B-B14F-4D97-AF65-F5344CB8AC3E}">
-        <p14:creationId xmlns:p14="http://schemas.microsoft.com/office/powerpoint/2010/main" val="2978190868"/>
-      </p:ext>
-    </p:extLst>
-  </p:cSld>
-  <p:clrMapOvr>
-    <a:masterClrMapping/>
-  </p:clrMapOvr>
-</p:sld>
-</file>
-
-<file path=ppt/slides/slide28.xml><?xml version="1.0" encoding="utf-8"?>
-<p:sld xmlns:a="http://schemas.openxmlformats.org/drawingml/2006/main" xmlns:r="http://schemas.openxmlformats.org/officeDocument/2006/relationships" xmlns:p="http://schemas.openxmlformats.org/presentationml/2006/main">
-  <p:cSld>
-    <p:spTree>
-      <p:nvGrpSpPr>
-        <p:cNvPr id="1" name=""/>
-        <p:cNvGrpSpPr/>
-        <p:nvPr/>
-      </p:nvGrpSpPr>
-      <p:grpSpPr>
-        <a:xfrm>
-          <a:off x="0" y="0"/>
-          <a:ext cx="0" cy="0"/>
-          <a:chOff x="0" y="0"/>
-          <a:chExt cx="0" cy="0"/>
-        </a:xfrm>
-      </p:grpSpPr>
-      <p:sp>
-        <p:nvSpPr>
-          <p:cNvPr id="2" name="Title 1">
-            <a:extLst>
-              <a:ext uri="{FF2B5EF4-FFF2-40B4-BE49-F238E27FC236}">
-                <a16:creationId xmlns:a16="http://schemas.microsoft.com/office/drawing/2014/main" id="{DB7A095A-0556-E1C4-1589-873534B9B01B}"/>
-              </a:ext>
-            </a:extLst>
-          </p:cNvPr>
-          <p:cNvSpPr>
-            <a:spLocks noGrp="1"/>
-          </p:cNvSpPr>
-          <p:nvPr>
-            <p:ph type="title"/>
-          </p:nvPr>
-        </p:nvSpPr>
-        <p:spPr/>
-        <p:txBody>
-          <a:bodyPr/>
-          <a:lstStyle/>
-          <a:p>
-            <a:r>
-              <a:rPr lang="en-US" dirty="0"/>
-              <a:t>Ways of Brainstorming Questions (Booth et al)</a:t>
-            </a:r>
-          </a:p>
-        </p:txBody>
-      </p:sp>
-      <p:sp>
-        <p:nvSpPr>
-          <p:cNvPr id="3" name="Content Placeholder 2">
-            <a:extLst>
-              <a:ext uri="{FF2B5EF4-FFF2-40B4-BE49-F238E27FC236}">
-                <a16:creationId xmlns:a16="http://schemas.microsoft.com/office/drawing/2014/main" id="{A11B3E00-AB4D-118F-A736-C8C9D3045873}"/>
-              </a:ext>
-            </a:extLst>
-          </p:cNvPr>
-          <p:cNvSpPr>
-            <a:spLocks noGrp="1"/>
-          </p:cNvSpPr>
-          <p:nvPr>
-            <p:ph idx="1"/>
-          </p:nvPr>
-        </p:nvSpPr>
-        <p:spPr>
-          <a:xfrm>
-            <a:off x="581192" y="2180496"/>
-            <a:ext cx="11029615" cy="4529062"/>
-          </a:xfrm>
-        </p:spPr>
-        <p:txBody>
-          <a:bodyPr>
-            <a:normAutofit/>
-          </a:bodyPr>
-          <a:lstStyle/>
-          <a:p>
-            <a:r>
-              <a:rPr lang="en-US" dirty="0"/>
-              <a:t>Think about the history of your topic</a:t>
-            </a:r>
-          </a:p>
-          <a:p>
-            <a:r>
-              <a:rPr lang="en-US" dirty="0"/>
-              <a:t>Ask about the structure or composition of your topic</a:t>
-            </a:r>
-          </a:p>
-          <a:p>
-            <a:r>
-              <a:rPr lang="en-US" b="1" dirty="0"/>
-              <a:t>Ask how the topic is categorized</a:t>
-            </a:r>
-          </a:p>
-          <a:p>
-            <a:pPr lvl="1"/>
-            <a:r>
-              <a:rPr lang="en-US" dirty="0"/>
-              <a:t>How can your topic be grouped into kinds? </a:t>
-            </a:r>
-          </a:p>
-          <a:p>
-            <a:pPr lvl="1"/>
-            <a:r>
-              <a:rPr lang="en-US" dirty="0"/>
-              <a:t>How does your topic compare/contrast with others like it? </a:t>
-            </a:r>
-          </a:p>
-          <a:p>
-            <a:r>
-              <a:rPr lang="en-US" dirty="0"/>
-              <a:t>Turn positive questions into negative ones </a:t>
-            </a:r>
-          </a:p>
-          <a:p>
-            <a:r>
-              <a:rPr lang="en-US" dirty="0"/>
-              <a:t>Ask “What if” and other speculative questions</a:t>
-            </a:r>
-          </a:p>
-          <a:p>
-            <a:r>
-              <a:rPr lang="en-US" dirty="0"/>
-              <a:t>Ask questions that are suggested by your sources</a:t>
-            </a:r>
-          </a:p>
-        </p:txBody>
-      </p:sp>
-    </p:spTree>
-    <p:extLst>
-      <p:ext uri="{BB962C8B-B14F-4D97-AF65-F5344CB8AC3E}">
-        <p14:creationId xmlns:p14="http://schemas.microsoft.com/office/powerpoint/2010/main" val="392062920"/>
-      </p:ext>
-    </p:extLst>
-  </p:cSld>
-  <p:clrMapOvr>
-    <a:masterClrMapping/>
-  </p:clrMapOvr>
-</p:sld>
-</file>
-
-<file path=ppt/slides/slide29.xml><?xml version="1.0" encoding="utf-8"?>
+<file path=ppt/slides/slide30.xml><?xml version="1.0" encoding="utf-8"?>
 <p:sld xmlns:a="http://schemas.openxmlformats.org/drawingml/2006/main" xmlns:r="http://schemas.openxmlformats.org/officeDocument/2006/relationships" xmlns:p="http://schemas.openxmlformats.org/presentationml/2006/main">
   <p:cSld>
     <p:spTree>
@@ -39900,139 +40562,7 @@
 </p:sld>
 </file>
 
-<file path=ppt/slides/slide3.xml><?xml version="1.0" encoding="utf-8"?>
-<p:sld xmlns:a="http://schemas.openxmlformats.org/drawingml/2006/main" xmlns:r="http://schemas.openxmlformats.org/officeDocument/2006/relationships" xmlns:p="http://schemas.openxmlformats.org/presentationml/2006/main">
-  <p:cSld>
-    <p:spTree>
-      <p:nvGrpSpPr>
-        <p:cNvPr id="1" name=""/>
-        <p:cNvGrpSpPr/>
-        <p:nvPr/>
-      </p:nvGrpSpPr>
-      <p:grpSpPr>
-        <a:xfrm>
-          <a:off x="0" y="0"/>
-          <a:ext cx="0" cy="0"/>
-          <a:chOff x="0" y="0"/>
-          <a:chExt cx="0" cy="0"/>
-        </a:xfrm>
-      </p:grpSpPr>
-      <p:sp>
-        <p:nvSpPr>
-          <p:cNvPr id="2" name="Title 1">
-            <a:extLst>
-              <a:ext uri="{FF2B5EF4-FFF2-40B4-BE49-F238E27FC236}">
-                <a16:creationId xmlns:a16="http://schemas.microsoft.com/office/drawing/2014/main" id="{C23DA6A7-F791-2F4F-F7B9-C7E235C72DC2}"/>
-              </a:ext>
-            </a:extLst>
-          </p:cNvPr>
-          <p:cNvSpPr>
-            <a:spLocks noGrp="1"/>
-          </p:cNvSpPr>
-          <p:nvPr>
-            <p:ph type="title"/>
-          </p:nvPr>
-        </p:nvSpPr>
-        <p:spPr/>
-        <p:txBody>
-          <a:bodyPr>
-            <a:normAutofit/>
-          </a:bodyPr>
-          <a:lstStyle/>
-          <a:p>
-            <a:r>
-              <a:rPr lang="en-US" dirty="0"/>
-              <a:t>Lab 2 - </a:t>
-            </a:r>
-            <a:r>
-              <a:rPr lang="en-US" sz="2800" b="0" kern="1200" dirty="0">
-                <a:effectLst/>
-              </a:rPr>
-              <a:t>my male coworkers keep vomiting emotionally on me</a:t>
-            </a:r>
-            <a:endParaRPr lang="en-US" dirty="0"/>
-          </a:p>
-        </p:txBody>
-      </p:sp>
-      <p:sp>
-        <p:nvSpPr>
-          <p:cNvPr id="3" name="Content Placeholder 2">
-            <a:extLst>
-              <a:ext uri="{FF2B5EF4-FFF2-40B4-BE49-F238E27FC236}">
-                <a16:creationId xmlns:a16="http://schemas.microsoft.com/office/drawing/2014/main" id="{F2372E0A-7D76-4EE1-4E59-0491E4632FE3}"/>
-              </a:ext>
-            </a:extLst>
-          </p:cNvPr>
-          <p:cNvSpPr>
-            <a:spLocks noGrp="1"/>
-          </p:cNvSpPr>
-          <p:nvPr>
-            <p:ph idx="1"/>
-          </p:nvPr>
-        </p:nvSpPr>
-        <p:spPr/>
-        <p:txBody>
-          <a:bodyPr/>
-          <a:lstStyle/>
-          <a:p>
-            <a:endParaRPr lang="en-US" dirty="0"/>
-          </a:p>
-          <a:p>
-            <a:r>
-              <a:rPr lang="en-US" dirty="0"/>
-              <a:t>Highest Deflection ABOs: </a:t>
-            </a:r>
-          </a:p>
-          <a:p>
-            <a:pPr lvl="1"/>
-            <a:r>
-              <a:rPr lang="en-US" dirty="0"/>
-              <a:t>Overwhelmed employee cares for distressed employee </a:t>
-            </a:r>
-          </a:p>
-          <a:p>
-            <a:pPr lvl="1"/>
-            <a:r>
-              <a:rPr lang="en-US" dirty="0"/>
-              <a:t>Helpless Data Entry Clerk Aid Emotional Data Entry Clerk</a:t>
-            </a:r>
-          </a:p>
-          <a:p>
-            <a:r>
-              <a:rPr lang="en-US" dirty="0"/>
-              <a:t>Lowest Deflection ABOs: </a:t>
-            </a:r>
-          </a:p>
-          <a:p>
-            <a:pPr lvl="1"/>
-            <a:r>
-              <a:rPr lang="en-US" dirty="0"/>
-              <a:t>Emotional Peer confide in Data Entry Clerk</a:t>
-            </a:r>
-          </a:p>
-          <a:p>
-            <a:pPr lvl="1"/>
-            <a:r>
-              <a:rPr lang="en-US" dirty="0"/>
-              <a:t>Emotional Male seeks advice from female Co-worker </a:t>
-            </a:r>
-          </a:p>
-        </p:txBody>
-      </p:sp>
-    </p:spTree>
-    <p:extLst>
-      <p:ext uri="{BB962C8B-B14F-4D97-AF65-F5344CB8AC3E}">
-        <p14:creationId xmlns:p14="http://schemas.microsoft.com/office/powerpoint/2010/main" val="2856508338"/>
-      </p:ext>
-    </p:extLst>
-  </p:cSld>
-  <p:clrMapOvr>
-    <a:masterClrMapping/>
-  </p:clrMapOvr>
-</p:sld>
-</file>
-
-<file path=ppt/slides/slide30.xml><?xml version="1.0" encoding="utf-8"?>
+<file path=ppt/slides/slide31.xml><?xml version="1.0" encoding="utf-8"?>
 <p:sld xmlns:a="http://schemas.openxmlformats.org/drawingml/2006/main" xmlns:r="http://schemas.openxmlformats.org/officeDocument/2006/relationships" xmlns:p="http://schemas.openxmlformats.org/presentationml/2006/main">
   <p:cSld>
     <p:spTree>
@@ -40166,7 +40696,7 @@
 </p:sld>
 </file>
 
-<file path=ppt/slides/slide31.xml><?xml version="1.0" encoding="utf-8"?>
+<file path=ppt/slides/slide32.xml><?xml version="1.0" encoding="utf-8"?>
 <p:sld xmlns:a="http://schemas.openxmlformats.org/drawingml/2006/main" xmlns:r="http://schemas.openxmlformats.org/officeDocument/2006/relationships" xmlns:p="http://schemas.openxmlformats.org/presentationml/2006/main">
   <p:cSld>
     <p:spTree>
@@ -40307,7 +40837,7 @@
 </p:sld>
 </file>
 
-<file path=ppt/slides/slide32.xml><?xml version="1.0" encoding="utf-8"?>
+<file path=ppt/slides/slide33.xml><?xml version="1.0" encoding="utf-8"?>
 <p:sld xmlns:a="http://schemas.openxmlformats.org/drawingml/2006/main" xmlns:r="http://schemas.openxmlformats.org/officeDocument/2006/relationships" xmlns:p="http://schemas.openxmlformats.org/presentationml/2006/main">
   <p:cSld>
     <p:spTree>
@@ -40423,6 +40953,138 @@
           <p:cNvPr id="2" name="Title 1">
             <a:extLst>
               <a:ext uri="{FF2B5EF4-FFF2-40B4-BE49-F238E27FC236}">
+                <a16:creationId xmlns:a16="http://schemas.microsoft.com/office/drawing/2014/main" id="{C23DA6A7-F791-2F4F-F7B9-C7E235C72DC2}"/>
+              </a:ext>
+            </a:extLst>
+          </p:cNvPr>
+          <p:cNvSpPr>
+            <a:spLocks noGrp="1"/>
+          </p:cNvSpPr>
+          <p:nvPr>
+            <p:ph type="title"/>
+          </p:nvPr>
+        </p:nvSpPr>
+        <p:spPr/>
+        <p:txBody>
+          <a:bodyPr>
+            <a:normAutofit/>
+          </a:bodyPr>
+          <a:lstStyle/>
+          <a:p>
+            <a:r>
+              <a:rPr lang="en-US" dirty="0"/>
+              <a:t>Lab 2 - </a:t>
+            </a:r>
+            <a:r>
+              <a:rPr lang="en-US" sz="2800" b="0" kern="1200" dirty="0">
+                <a:effectLst/>
+              </a:rPr>
+              <a:t>my male coworkers keep vomiting emotionally on me</a:t>
+            </a:r>
+            <a:endParaRPr lang="en-US" dirty="0"/>
+          </a:p>
+        </p:txBody>
+      </p:sp>
+      <p:sp>
+        <p:nvSpPr>
+          <p:cNvPr id="3" name="Content Placeholder 2">
+            <a:extLst>
+              <a:ext uri="{FF2B5EF4-FFF2-40B4-BE49-F238E27FC236}">
+                <a16:creationId xmlns:a16="http://schemas.microsoft.com/office/drawing/2014/main" id="{F2372E0A-7D76-4EE1-4E59-0491E4632FE3}"/>
+              </a:ext>
+            </a:extLst>
+          </p:cNvPr>
+          <p:cNvSpPr>
+            <a:spLocks noGrp="1"/>
+          </p:cNvSpPr>
+          <p:nvPr>
+            <p:ph idx="1"/>
+          </p:nvPr>
+        </p:nvSpPr>
+        <p:spPr/>
+        <p:txBody>
+          <a:bodyPr/>
+          <a:lstStyle/>
+          <a:p>
+            <a:endParaRPr lang="en-US" dirty="0"/>
+          </a:p>
+          <a:p>
+            <a:r>
+              <a:rPr lang="en-US" dirty="0"/>
+              <a:t>Highest Deflection ABOs: </a:t>
+            </a:r>
+          </a:p>
+          <a:p>
+            <a:pPr lvl="1"/>
+            <a:r>
+              <a:rPr lang="en-US" dirty="0"/>
+              <a:t>Overwhelmed employee cares for distressed employee </a:t>
+            </a:r>
+          </a:p>
+          <a:p>
+            <a:pPr lvl="1"/>
+            <a:r>
+              <a:rPr lang="en-US" dirty="0"/>
+              <a:t>Helpless Data Entry Clerk Aid Emotional Data Entry Clerk</a:t>
+            </a:r>
+          </a:p>
+          <a:p>
+            <a:r>
+              <a:rPr lang="en-US" dirty="0"/>
+              <a:t>Lowest Deflection ABOs: </a:t>
+            </a:r>
+          </a:p>
+          <a:p>
+            <a:pPr lvl="1"/>
+            <a:r>
+              <a:rPr lang="en-US" dirty="0"/>
+              <a:t>Emotional Peer confide in Data Entry Clerk</a:t>
+            </a:r>
+          </a:p>
+          <a:p>
+            <a:pPr lvl="1"/>
+            <a:r>
+              <a:rPr lang="en-US" dirty="0"/>
+              <a:t>Emotional Male seeks advice from female Co-worker </a:t>
+            </a:r>
+          </a:p>
+        </p:txBody>
+      </p:sp>
+    </p:spTree>
+    <p:extLst>
+      <p:ext uri="{BB962C8B-B14F-4D97-AF65-F5344CB8AC3E}">
+        <p14:creationId xmlns:p14="http://schemas.microsoft.com/office/powerpoint/2010/main" val="2856508338"/>
+      </p:ext>
+    </p:extLst>
+  </p:cSld>
+  <p:clrMapOvr>
+    <a:masterClrMapping/>
+  </p:clrMapOvr>
+</p:sld>
+</file>
+
+<file path=ppt/slides/slide5.xml><?xml version="1.0" encoding="utf-8"?>
+<p:sld xmlns:a="http://schemas.openxmlformats.org/drawingml/2006/main" xmlns:r="http://schemas.openxmlformats.org/officeDocument/2006/relationships" xmlns:p="http://schemas.openxmlformats.org/presentationml/2006/main">
+  <p:cSld>
+    <p:spTree>
+      <p:nvGrpSpPr>
+        <p:cNvPr id="1" name=""/>
+        <p:cNvGrpSpPr/>
+        <p:nvPr/>
+      </p:nvGrpSpPr>
+      <p:grpSpPr>
+        <a:xfrm>
+          <a:off x="0" y="0"/>
+          <a:ext cx="0" cy="0"/>
+          <a:chOff x="0" y="0"/>
+          <a:chExt cx="0" cy="0"/>
+        </a:xfrm>
+      </p:grpSpPr>
+      <p:sp>
+        <p:nvSpPr>
+          <p:cNvPr id="2" name="Title 1">
+            <a:extLst>
+              <a:ext uri="{FF2B5EF4-FFF2-40B4-BE49-F238E27FC236}">
                 <a16:creationId xmlns:a16="http://schemas.microsoft.com/office/drawing/2014/main" id="{ED67C5E0-842F-31EC-3C99-AA385843DACC}"/>
               </a:ext>
             </a:extLst>
@@ -40505,7 +41167,7 @@
 </p:sld>
 </file>
 
-<file path=ppt/slides/slide5.xml><?xml version="1.0" encoding="utf-8"?>
+<file path=ppt/slides/slide6.xml><?xml version="1.0" encoding="utf-8"?>
 <p:sld xmlns:a="http://schemas.openxmlformats.org/drawingml/2006/main" xmlns:r="http://schemas.openxmlformats.org/officeDocument/2006/relationships" xmlns:p="http://schemas.openxmlformats.org/presentationml/2006/main">
   <p:cSld>
     <p:spTree>
@@ -40566,7 +41228,7 @@
             <p:ph idx="1"/>
             <p:extLst>
               <p:ext uri="{D42A27DB-BD31-4B8C-83A1-F6EECF244321}">
-                <p14:modId xmlns:p14="http://schemas.microsoft.com/office/powerpoint/2010/main" val="4253014540"/>
+                <p14:modId xmlns:p14="http://schemas.microsoft.com/office/powerpoint/2010/main" val="956901518"/>
               </p:ext>
             </p:extLst>
           </p:nvPr>
@@ -40594,7 +41256,7 @@
 </p:sld>
 </file>
 
-<file path=ppt/slides/slide6.xml><?xml version="1.0" encoding="utf-8"?>
+<file path=ppt/slides/slide7.xml><?xml version="1.0" encoding="utf-8"?>
 <p:sld xmlns:a="http://schemas.openxmlformats.org/drawingml/2006/main" xmlns:r="http://schemas.openxmlformats.org/officeDocument/2006/relationships" xmlns:p="http://schemas.openxmlformats.org/presentationml/2006/main">
   <p:cSld>
     <p:spTree>
@@ -40752,7 +41414,7 @@
 </p:sld>
 </file>
 
-<file path=ppt/slides/slide7.xml><?xml version="1.0" encoding="utf-8"?>
+<file path=ppt/slides/slide8.xml><?xml version="1.0" encoding="utf-8"?>
 <p:sld xmlns:a="http://schemas.openxmlformats.org/drawingml/2006/main" xmlns:r="http://schemas.openxmlformats.org/officeDocument/2006/relationships" xmlns:p="http://schemas.openxmlformats.org/presentationml/2006/main">
   <p:cSld>
     <p:spTree>
@@ -40887,7 +41549,7 @@
 </p:sld>
 </file>
 
-<file path=ppt/slides/slide8.xml><?xml version="1.0" encoding="utf-8"?>
+<file path=ppt/slides/slide9.xml><?xml version="1.0" encoding="utf-8"?>
 <p:sld xmlns:a="http://schemas.openxmlformats.org/drawingml/2006/main" xmlns:r="http://schemas.openxmlformats.org/officeDocument/2006/relationships" xmlns:p="http://schemas.openxmlformats.org/presentationml/2006/main">
   <p:cSld>
     <p:bg>
@@ -41050,551 +41712,6 @@
     <p:extLst>
       <p:ext uri="{BB962C8B-B14F-4D97-AF65-F5344CB8AC3E}">
         <p14:creationId xmlns:p14="http://schemas.microsoft.com/office/powerpoint/2010/main" val="923335948"/>
-      </p:ext>
-    </p:extLst>
-  </p:cSld>
-  <p:clrMapOvr>
-    <a:masterClrMapping/>
-  </p:clrMapOvr>
-</p:sld>
-</file>
-
-<file path=ppt/slides/slide9.xml><?xml version="1.0" encoding="utf-8"?>
-<p:sld xmlns:a="http://schemas.openxmlformats.org/drawingml/2006/main" xmlns:r="http://schemas.openxmlformats.org/officeDocument/2006/relationships" xmlns:p="http://schemas.openxmlformats.org/presentationml/2006/main">
-  <p:cSld>
-    <p:bg>
-      <p:bgPr>
-        <a:solidFill>
-          <a:schemeClr val="bg1"/>
-        </a:solidFill>
-        <a:effectLst/>
-      </p:bgPr>
-    </p:bg>
-    <p:spTree>
-      <p:nvGrpSpPr>
-        <p:cNvPr id="1" name=""/>
-        <p:cNvGrpSpPr/>
-        <p:nvPr/>
-      </p:nvGrpSpPr>
-      <p:grpSpPr>
-        <a:xfrm>
-          <a:off x="0" y="0"/>
-          <a:ext cx="0" cy="0"/>
-          <a:chOff x="0" y="0"/>
-          <a:chExt cx="0" cy="0"/>
-        </a:xfrm>
-      </p:grpSpPr>
-      <p:sp>
-        <p:nvSpPr>
-          <p:cNvPr id="8" name="Rectangle 7">
-            <a:extLst>
-              <a:ext uri="{FF2B5EF4-FFF2-40B4-BE49-F238E27FC236}">
-                <a16:creationId xmlns:a16="http://schemas.microsoft.com/office/drawing/2014/main" id="{1A59258C-AAC2-41CD-973C-7439B122A3FF}"/>
-              </a:ext>
-              <a:ext uri="{C183D7F6-B498-43B3-948B-1728B52AA6E4}">
-                <adec:decorative xmlns:adec="http://schemas.microsoft.com/office/drawing/2017/decorative" val="1"/>
-              </a:ext>
-            </a:extLst>
-          </p:cNvPr>
-          <p:cNvSpPr>
-            <a:spLocks noGrp="1" noRot="1" noChangeAspect="1" noMove="1" noResize="1" noEditPoints="1" noAdjustHandles="1" noChangeArrowheads="1" noChangeShapeType="1" noTextEdit="1"/>
-          </p:cNvSpPr>
-          <p:nvPr>
-            <p:extLst>
-              <p:ext uri="{386F3935-93C4-4BCD-93E2-E3B085C9AB24}">
-                <p16:designElem xmlns:p16="http://schemas.microsoft.com/office/powerpoint/2015/main" val="1"/>
-              </p:ext>
-            </p:extLst>
-          </p:nvPr>
-        </p:nvSpPr>
-        <p:spPr>
-          <a:xfrm>
-            <a:off x="0" y="0"/>
-            <a:ext cx="12192000" cy="6858000"/>
-          </a:xfrm>
-          <a:prstGeom prst="rect">
-            <a:avLst/>
-          </a:prstGeom>
-          <a:solidFill>
-            <a:srgbClr val="FFFFFF"/>
-          </a:solidFill>
-          <a:ln>
-            <a:noFill/>
-          </a:ln>
-        </p:spPr>
-        <p:style>
-          <a:lnRef idx="2">
-            <a:schemeClr val="accent1">
-              <a:shade val="50000"/>
-            </a:schemeClr>
-          </a:lnRef>
-          <a:fillRef idx="1">
-            <a:schemeClr val="accent1"/>
-          </a:fillRef>
-          <a:effectRef idx="0">
-            <a:schemeClr val="accent1"/>
-          </a:effectRef>
-          <a:fontRef idx="minor">
-            <a:schemeClr val="lt1"/>
-          </a:fontRef>
-        </p:style>
-        <p:txBody>
-          <a:bodyPr rtlCol="0" anchor="ctr"/>
-          <a:lstStyle/>
-          <a:p>
-            <a:pPr marL="285750" indent="-285750" algn="ctr">
-              <a:buClr>
-                <a:schemeClr val="accent1"/>
-              </a:buClr>
-              <a:buFont typeface="Arial" panose="020B0604020202020204" pitchFamily="34" charset="0"/>
-              <a:buChar char="•"/>
-            </a:pPr>
-            <a:endParaRPr lang="en-US" dirty="0"/>
-          </a:p>
-        </p:txBody>
-      </p:sp>
-      <p:sp>
-        <p:nvSpPr>
-          <p:cNvPr id="10" name="Rectangle 9">
-            <a:extLst>
-              <a:ext uri="{FF2B5EF4-FFF2-40B4-BE49-F238E27FC236}">
-                <a16:creationId xmlns:a16="http://schemas.microsoft.com/office/drawing/2014/main" id="{54516B72-0116-42B2-82A2-B11218A36636}"/>
-              </a:ext>
-              <a:ext uri="{C183D7F6-B498-43B3-948B-1728B52AA6E4}">
-                <adec:decorative xmlns:adec="http://schemas.microsoft.com/office/drawing/2017/decorative" val="1"/>
-              </a:ext>
-            </a:extLst>
-          </p:cNvPr>
-          <p:cNvSpPr>
-            <a:spLocks noGrp="1" noRot="1" noChangeAspect="1" noMove="1" noResize="1" noEditPoints="1" noAdjustHandles="1" noChangeArrowheads="1" noChangeShapeType="1" noTextEdit="1"/>
-          </p:cNvSpPr>
-          <p:nvPr>
-            <p:extLst>
-              <p:ext uri="{386F3935-93C4-4BCD-93E2-E3B085C9AB24}">
-                <p16:designElem xmlns:p16="http://schemas.microsoft.com/office/powerpoint/2015/main" val="1"/>
-              </p:ext>
-            </p:extLst>
-          </p:nvPr>
-        </p:nvSpPr>
-        <p:spPr>
-          <a:xfrm>
-            <a:off x="-1" y="0"/>
-            <a:ext cx="6113191" cy="6858000"/>
-          </a:xfrm>
-          <a:prstGeom prst="rect">
-            <a:avLst/>
-          </a:prstGeom>
-          <a:ln>
-            <a:noFill/>
-          </a:ln>
-        </p:spPr>
-        <p:style>
-          <a:lnRef idx="2">
-            <a:schemeClr val="accent1">
-              <a:shade val="50000"/>
-            </a:schemeClr>
-          </a:lnRef>
-          <a:fillRef idx="1">
-            <a:schemeClr val="accent1"/>
-          </a:fillRef>
-          <a:effectRef idx="0">
-            <a:schemeClr val="accent1"/>
-          </a:effectRef>
-          <a:fontRef idx="minor">
-            <a:schemeClr val="lt1"/>
-          </a:fontRef>
-        </p:style>
-        <p:txBody>
-          <a:bodyPr rtlCol="0" anchor="ctr"/>
-          <a:lstStyle/>
-          <a:p>
-            <a:pPr algn="ctr"/>
-            <a:endParaRPr lang="en-US"/>
-          </a:p>
-        </p:txBody>
-      </p:sp>
-      <p:sp>
-        <p:nvSpPr>
-          <p:cNvPr id="2" name="Title 1">
-            <a:extLst>
-              <a:ext uri="{FF2B5EF4-FFF2-40B4-BE49-F238E27FC236}">
-                <a16:creationId xmlns:a16="http://schemas.microsoft.com/office/drawing/2014/main" id="{1218D4B8-B217-95EA-33ED-C76DCA0CDFA4}"/>
-              </a:ext>
-            </a:extLst>
-          </p:cNvPr>
-          <p:cNvSpPr>
-            <a:spLocks noGrp="1"/>
-          </p:cNvSpPr>
-          <p:nvPr>
-            <p:ph type="title"/>
-          </p:nvPr>
-        </p:nvSpPr>
-        <p:spPr>
-          <a:xfrm>
-            <a:off x="643468" y="1033389"/>
-            <a:ext cx="4826256" cy="4825409"/>
-          </a:xfrm>
-        </p:spPr>
-        <p:txBody>
-          <a:bodyPr anchor="ctr">
-            <a:normAutofit/>
-          </a:bodyPr>
-          <a:lstStyle/>
-          <a:p>
-            <a:r>
-              <a:rPr lang="en-US" sz="5400">
-                <a:solidFill>
-                  <a:srgbClr val="FFFFFF"/>
-                </a:solidFill>
-              </a:rPr>
-              <a:t>What makes A research Question ‘Good’?</a:t>
-            </a:r>
-          </a:p>
-        </p:txBody>
-      </p:sp>
-      <p:sp>
-        <p:nvSpPr>
-          <p:cNvPr id="12" name="Rectangle 11">
-            <a:extLst>
-              <a:ext uri="{FF2B5EF4-FFF2-40B4-BE49-F238E27FC236}">
-                <a16:creationId xmlns:a16="http://schemas.microsoft.com/office/drawing/2014/main" id="{7CDB507F-21B7-4C27-B0FC-D9C465C6DB44}"/>
-              </a:ext>
-              <a:ext uri="{C183D7F6-B498-43B3-948B-1728B52AA6E4}">
-                <adec:decorative xmlns:adec="http://schemas.microsoft.com/office/drawing/2017/decorative" val="1"/>
-              </a:ext>
-            </a:extLst>
-          </p:cNvPr>
-          <p:cNvSpPr>
-            <a:spLocks noGrp="1" noRot="1" noChangeAspect="1" noMove="1" noResize="1" noEditPoints="1" noAdjustHandles="1" noChangeArrowheads="1" noChangeShapeType="1" noTextEdit="1"/>
-          </p:cNvSpPr>
-          <p:nvPr>
-            <p:extLst>
-              <p:ext uri="{386F3935-93C4-4BCD-93E2-E3B085C9AB24}">
-                <p16:designElem xmlns:p16="http://schemas.microsoft.com/office/powerpoint/2015/main" val="1"/>
-              </p:ext>
-            </p:extLst>
-          </p:nvPr>
-        </p:nvSpPr>
-        <p:spPr>
-          <a:xfrm>
-            <a:off x="642579" y="460868"/>
-            <a:ext cx="4828032" cy="111654"/>
-          </a:xfrm>
-          <a:prstGeom prst="rect">
-            <a:avLst/>
-          </a:prstGeom>
-          <a:solidFill>
-            <a:srgbClr val="FFFFFF"/>
-          </a:solidFill>
-          <a:ln>
-            <a:noFill/>
-          </a:ln>
-          <a:effectLst/>
-        </p:spPr>
-        <p:style>
-          <a:lnRef idx="1">
-            <a:schemeClr val="accent1"/>
-          </a:lnRef>
-          <a:fillRef idx="3">
-            <a:schemeClr val="accent1"/>
-          </a:fillRef>
-          <a:effectRef idx="2">
-            <a:schemeClr val="accent1"/>
-          </a:effectRef>
-          <a:fontRef idx="minor">
-            <a:schemeClr val="lt1"/>
-          </a:fontRef>
-        </p:style>
-      </p:sp>
-      <p:sp>
-        <p:nvSpPr>
-          <p:cNvPr id="14" name="Rectangle 13">
-            <a:extLst>
-              <a:ext uri="{FF2B5EF4-FFF2-40B4-BE49-F238E27FC236}">
-                <a16:creationId xmlns:a16="http://schemas.microsoft.com/office/drawing/2014/main" id="{7AB1AE17-B7A3-4363-95CD-25441E2FF1F3}"/>
-              </a:ext>
-              <a:ext uri="{C183D7F6-B498-43B3-948B-1728B52AA6E4}">
-                <adec:decorative xmlns:adec="http://schemas.microsoft.com/office/drawing/2017/decorative" val="1"/>
-              </a:ext>
-            </a:extLst>
-          </p:cNvPr>
-          <p:cNvSpPr>
-            <a:spLocks noGrp="1" noRot="1" noChangeAspect="1" noMove="1" noResize="1" noEditPoints="1" noAdjustHandles="1" noChangeArrowheads="1" noChangeShapeType="1" noTextEdit="1"/>
-          </p:cNvSpPr>
-          <p:nvPr>
-            <p:extLst>
-              <p:ext uri="{386F3935-93C4-4BCD-93E2-E3B085C9AB24}">
-                <p16:designElem xmlns:p16="http://schemas.microsoft.com/office/powerpoint/2015/main" val="1"/>
-              </p:ext>
-            </p:extLst>
-          </p:nvPr>
-        </p:nvSpPr>
-        <p:spPr>
-          <a:xfrm>
-            <a:off x="6782774" y="460868"/>
-            <a:ext cx="4828032" cy="111654"/>
-          </a:xfrm>
-          <a:prstGeom prst="rect">
-            <a:avLst/>
-          </a:prstGeom>
-          <a:solidFill>
-            <a:schemeClr val="accent2"/>
-          </a:solidFill>
-          <a:ln>
-            <a:noFill/>
-          </a:ln>
-          <a:effectLst/>
-        </p:spPr>
-        <p:style>
-          <a:lnRef idx="1">
-            <a:schemeClr val="accent1"/>
-          </a:lnRef>
-          <a:fillRef idx="3">
-            <a:schemeClr val="accent1"/>
-          </a:fillRef>
-          <a:effectRef idx="2">
-            <a:schemeClr val="accent1"/>
-          </a:effectRef>
-          <a:fontRef idx="minor">
-            <a:schemeClr val="lt1"/>
-          </a:fontRef>
-        </p:style>
-      </p:sp>
-      <p:sp>
-        <p:nvSpPr>
-          <p:cNvPr id="3" name="Content Placeholder 2">
-            <a:extLst>
-              <a:ext uri="{FF2B5EF4-FFF2-40B4-BE49-F238E27FC236}">
-                <a16:creationId xmlns:a16="http://schemas.microsoft.com/office/drawing/2014/main" id="{EC3E2053-2CE9-96BE-A25D-C0257F4B641A}"/>
-              </a:ext>
-            </a:extLst>
-          </p:cNvPr>
-          <p:cNvSpPr>
-            <a:spLocks noGrp="1"/>
-          </p:cNvSpPr>
-          <p:nvPr>
-            <p:ph idx="1"/>
-          </p:nvPr>
-        </p:nvSpPr>
-        <p:spPr>
-          <a:xfrm>
-            <a:off x="6755769" y="1033390"/>
-            <a:ext cx="4855037" cy="4825409"/>
-          </a:xfrm>
-          <a:ln w="57150">
-            <a:noFill/>
-          </a:ln>
-        </p:spPr>
-        <p:txBody>
-          <a:bodyPr anchor="ctr">
-            <a:normAutofit/>
-          </a:bodyPr>
-          <a:lstStyle/>
-          <a:p>
-            <a:pPr>
-              <a:spcBef>
-                <a:spcPct val="50000"/>
-              </a:spcBef>
-              <a:buFont typeface="Symbol" charset="0"/>
-              <a:buNone/>
-              <a:defRPr/>
-            </a:pPr>
-            <a:r>
-              <a:rPr lang="en-US" sz="1900" b="1">
-                <a:solidFill>
-                  <a:schemeClr val="accent2">
-                    <a:lumMod val="50000"/>
-                  </a:schemeClr>
-                </a:solidFill>
-                <a:ea typeface="ＭＳ Ｐゴシック" charset="0"/>
-                <a:cs typeface="Times New Roman" charset="0"/>
-              </a:rPr>
-              <a:t>1. </a:t>
-            </a:r>
-            <a:r>
-              <a:rPr lang="en-US" sz="1900" b="1" u="sng">
-                <a:solidFill>
-                  <a:schemeClr val="accent2">
-                    <a:lumMod val="50000"/>
-                  </a:schemeClr>
-                </a:solidFill>
-                <a:ea typeface="ＭＳ Ｐゴシック" charset="0"/>
-                <a:cs typeface="Times New Roman" charset="0"/>
-              </a:rPr>
-              <a:t>Feasibility</a:t>
-            </a:r>
-            <a:r>
-              <a:rPr lang="en-US" sz="1900" b="1">
-                <a:solidFill>
-                  <a:schemeClr val="accent2">
-                    <a:lumMod val="50000"/>
-                  </a:schemeClr>
-                </a:solidFill>
-                <a:ea typeface="ＭＳ Ｐゴシック" charset="0"/>
-                <a:cs typeface="Times New Roman" charset="0"/>
-              </a:rPr>
-              <a:t>: Can you start and finish an investigation of your research question with the resources that you can obtain and in the time that is available?</a:t>
-            </a:r>
-          </a:p>
-          <a:p>
-            <a:pPr>
-              <a:spcBef>
-                <a:spcPct val="50000"/>
-              </a:spcBef>
-              <a:buFont typeface="Symbol" charset="0"/>
-              <a:buNone/>
-              <a:defRPr/>
-            </a:pPr>
-            <a:r>
-              <a:rPr lang="en-US" sz="1900" b="1">
-                <a:solidFill>
-                  <a:schemeClr val="accent2">
-                    <a:lumMod val="50000"/>
-                  </a:schemeClr>
-                </a:solidFill>
-                <a:ea typeface="ＭＳ Ｐゴシック" charset="0"/>
-                <a:cs typeface="Times New Roman" charset="0"/>
-              </a:rPr>
-              <a:t>2. </a:t>
-            </a:r>
-            <a:r>
-              <a:rPr lang="en-US" sz="1900" b="1" u="sng">
-                <a:solidFill>
-                  <a:schemeClr val="accent2">
-                    <a:lumMod val="50000"/>
-                  </a:schemeClr>
-                </a:solidFill>
-                <a:ea typeface="ＭＳ Ｐゴシック" charset="0"/>
-                <a:cs typeface="Times New Roman" charset="0"/>
-              </a:rPr>
-              <a:t>Social Importance</a:t>
-            </a:r>
-            <a:r>
-              <a:rPr lang="en-US" sz="1900" b="1">
-                <a:solidFill>
-                  <a:schemeClr val="accent2">
-                    <a:lumMod val="50000"/>
-                  </a:schemeClr>
-                </a:solidFill>
-                <a:ea typeface="ＭＳ Ｐゴシック" charset="0"/>
-                <a:cs typeface="Times New Roman" charset="0"/>
-              </a:rPr>
-              <a:t>: Will an answer to your research question make a difference in the social world, even if that is only in terms of helping people understand a problem they consider important? </a:t>
-            </a:r>
-          </a:p>
-          <a:p>
-            <a:pPr>
-              <a:spcBef>
-                <a:spcPct val="50000"/>
-              </a:spcBef>
-              <a:buFont typeface="Symbol" charset="0"/>
-              <a:buNone/>
-              <a:defRPr/>
-            </a:pPr>
-            <a:r>
-              <a:rPr lang="en-US" sz="1900" b="1">
-                <a:solidFill>
-                  <a:schemeClr val="accent2">
-                    <a:lumMod val="50000"/>
-                  </a:schemeClr>
-                </a:solidFill>
-                <a:ea typeface="ＭＳ Ｐゴシック" charset="0"/>
-                <a:cs typeface="Times New Roman" charset="0"/>
-              </a:rPr>
-              <a:t>3. </a:t>
-            </a:r>
-            <a:r>
-              <a:rPr lang="en-US" sz="1900" b="1" u="sng">
-                <a:solidFill>
-                  <a:schemeClr val="accent2">
-                    <a:lumMod val="50000"/>
-                  </a:schemeClr>
-                </a:solidFill>
-                <a:ea typeface="ＭＳ Ｐゴシック" charset="0"/>
-                <a:cs typeface="Times New Roman" charset="0"/>
-              </a:rPr>
-              <a:t>Scientific Relevance</a:t>
-            </a:r>
-            <a:r>
-              <a:rPr lang="en-US" sz="1900" b="1">
-                <a:solidFill>
-                  <a:schemeClr val="accent2">
-                    <a:lumMod val="50000"/>
-                  </a:schemeClr>
-                </a:solidFill>
-                <a:ea typeface="ＭＳ Ｐゴシック" charset="0"/>
-                <a:cs typeface="Times New Roman" charset="0"/>
-              </a:rPr>
-              <a:t>: Does your research question help to resolve some contradictory research findings or a puzzling issue in social theory?  </a:t>
-            </a:r>
-          </a:p>
-        </p:txBody>
-      </p:sp>
-      <p:sp>
-        <p:nvSpPr>
-          <p:cNvPr id="4" name="TextBox 3">
-            <a:extLst>
-              <a:ext uri="{FF2B5EF4-FFF2-40B4-BE49-F238E27FC236}">
-                <a16:creationId xmlns:a16="http://schemas.microsoft.com/office/drawing/2014/main" id="{D487536C-52E2-1D45-8E78-4C411E9DE07C}"/>
-              </a:ext>
-            </a:extLst>
-          </p:cNvPr>
-          <p:cNvSpPr txBox="1"/>
-          <p:nvPr/>
-        </p:nvSpPr>
-        <p:spPr>
-          <a:xfrm>
-            <a:off x="9473114" y="6550223"/>
-            <a:ext cx="2718886" cy="307777"/>
-          </a:xfrm>
-          <a:prstGeom prst="rect">
-            <a:avLst/>
-          </a:prstGeom>
-          <a:noFill/>
-        </p:spPr>
-        <p:txBody>
-          <a:bodyPr wrap="none" rtlCol="0">
-            <a:spAutoFit/>
-          </a:bodyPr>
-          <a:lstStyle/>
-          <a:p>
-            <a:r>
-              <a:rPr lang="en-US" sz="1400" b="1" dirty="0">
-                <a:solidFill>
-                  <a:srgbClr val="000000"/>
-                </a:solidFill>
-                <a:ea typeface="ＭＳ Ｐゴシック" charset="0"/>
-                <a:cs typeface="Times New Roman" charset="0"/>
-              </a:rPr>
-              <a:t>(King, Keohane, &amp; </a:t>
-            </a:r>
-            <a:r>
-              <a:rPr lang="en-US" sz="1400" b="1" dirty="0" err="1">
-                <a:solidFill>
-                  <a:srgbClr val="000000"/>
-                </a:solidFill>
-                <a:ea typeface="ＭＳ Ｐゴシック" charset="0"/>
-                <a:cs typeface="Times New Roman" charset="0"/>
-              </a:rPr>
-              <a:t>Verba</a:t>
-            </a:r>
-            <a:r>
-              <a:rPr lang="en-US" sz="1400" b="1" dirty="0">
-                <a:solidFill>
-                  <a:srgbClr val="000000"/>
-                </a:solidFill>
-                <a:ea typeface="ＭＳ Ｐゴシック" charset="0"/>
-                <a:cs typeface="Times New Roman" charset="0"/>
-              </a:rPr>
-              <a:t>, 1994)</a:t>
-            </a:r>
-          </a:p>
-        </p:txBody>
-      </p:sp>
-    </p:spTree>
-    <p:extLst>
-      <p:ext uri="{BB962C8B-B14F-4D97-AF65-F5344CB8AC3E}">
-        <p14:creationId xmlns:p14="http://schemas.microsoft.com/office/powerpoint/2010/main" val="1248193097"/>
       </p:ext>
     </p:extLst>
   </p:cSld>

</xml_diff>